<commit_message>
1. Answer Bonus01 & 02\n2. Add Install Node.js Pictures for Windows user
</commit_message>
<xml_diff>
--- a/Homework_1/images/images.pptx
+++ b/Homework_1/images/images.pptx
@@ -5,10 +5,32 @@
     <p:sldMasterId id="2147483648" r:id="rId1"/>
   </p:sldMasterIdLst>
   <p:sldIdLst>
-    <p:sldId id="256" r:id="rId2"/>
-    <p:sldId id="257" r:id="rId3"/>
-    <p:sldId id="258" r:id="rId4"/>
-    <p:sldId id="259" r:id="rId5"/>
+    <p:sldId id="275" r:id="rId2"/>
+    <p:sldId id="265" r:id="rId3"/>
+    <p:sldId id="266" r:id="rId4"/>
+    <p:sldId id="267" r:id="rId5"/>
+    <p:sldId id="268" r:id="rId6"/>
+    <p:sldId id="269" r:id="rId7"/>
+    <p:sldId id="270" r:id="rId8"/>
+    <p:sldId id="271" r:id="rId9"/>
+    <p:sldId id="281" r:id="rId10"/>
+    <p:sldId id="282" r:id="rId11"/>
+    <p:sldId id="272" r:id="rId12"/>
+    <p:sldId id="273" r:id="rId13"/>
+    <p:sldId id="274" r:id="rId14"/>
+    <p:sldId id="276" r:id="rId15"/>
+    <p:sldId id="277" r:id="rId16"/>
+    <p:sldId id="278" r:id="rId17"/>
+    <p:sldId id="279" r:id="rId18"/>
+    <p:sldId id="280" r:id="rId19"/>
+    <p:sldId id="256" r:id="rId20"/>
+    <p:sldId id="257" r:id="rId21"/>
+    <p:sldId id="258" r:id="rId22"/>
+    <p:sldId id="259" r:id="rId23"/>
+    <p:sldId id="260" r:id="rId24"/>
+    <p:sldId id="261" r:id="rId25"/>
+    <p:sldId id="263" r:id="rId26"/>
+    <p:sldId id="262" r:id="rId27"/>
   </p:sldIdLst>
   <p:sldSz cx="12192000" cy="6858000"/>
   <p:notesSz cx="6858000" cy="9144000"/>
@@ -157,10 +179,9 @@
           </a:lstStyle>
           <a:p>
             <a:r>
-              <a:rPr lang="zh-TW" altLang="en-US" smtClean="0"/>
+              <a:rPr lang="zh-TW" altLang="en-US"/>
               <a:t>按一下以編輯母片標題樣式</a:t>
             </a:r>
-            <a:endParaRPr lang="zh-TW" altLang="en-US"/>
           </a:p>
         </p:txBody>
       </p:sp>
@@ -222,10 +243,9 @@
           </a:lstStyle>
           <a:p>
             <a:r>
-              <a:rPr lang="zh-TW" altLang="en-US" smtClean="0"/>
+              <a:rPr lang="zh-TW" altLang="en-US"/>
               <a:t>按一下以編輯母片副標題樣式</a:t>
             </a:r>
-            <a:endParaRPr lang="zh-TW" altLang="en-US"/>
           </a:p>
         </p:txBody>
       </p:sp>
@@ -246,7 +266,7 @@
           <a:p>
             <a:fld id="{12E7C0A1-DC17-44F8-A960-0280B3DAE314}" type="datetimeFigureOut">
               <a:rPr lang="zh-TW" altLang="en-US" smtClean="0"/>
-              <a:t>2018/10/15</a:t>
+              <a:t>2018/10/27</a:t>
             </a:fld>
             <a:endParaRPr lang="zh-TW" altLang="en-US"/>
           </a:p>
@@ -340,10 +360,9 @@
           <a:lstStyle/>
           <a:p>
             <a:r>
-              <a:rPr lang="zh-TW" altLang="en-US" smtClean="0"/>
+              <a:rPr lang="zh-TW" altLang="en-US"/>
               <a:t>按一下以編輯母片標題樣式</a:t>
             </a:r>
-            <a:endParaRPr lang="zh-TW" altLang="en-US"/>
           </a:p>
         </p:txBody>
       </p:sp>
@@ -364,38 +383,37 @@
           <a:p>
             <a:pPr lvl="0"/>
             <a:r>
-              <a:rPr lang="zh-TW" altLang="en-US" smtClean="0"/>
+              <a:rPr lang="zh-TW" altLang="en-US"/>
               <a:t>編輯母片文字樣式</a:t>
             </a:r>
           </a:p>
           <a:p>
             <a:pPr lvl="1"/>
             <a:r>
-              <a:rPr lang="zh-TW" altLang="en-US" smtClean="0"/>
+              <a:rPr lang="zh-TW" altLang="en-US"/>
               <a:t>第二層</a:t>
             </a:r>
           </a:p>
           <a:p>
             <a:pPr lvl="2"/>
             <a:r>
-              <a:rPr lang="zh-TW" altLang="en-US" smtClean="0"/>
+              <a:rPr lang="zh-TW" altLang="en-US"/>
               <a:t>第三層</a:t>
             </a:r>
           </a:p>
           <a:p>
             <a:pPr lvl="3"/>
             <a:r>
-              <a:rPr lang="zh-TW" altLang="en-US" smtClean="0"/>
+              <a:rPr lang="zh-TW" altLang="en-US"/>
               <a:t>第四層</a:t>
             </a:r>
           </a:p>
           <a:p>
             <a:pPr lvl="4"/>
             <a:r>
-              <a:rPr lang="zh-TW" altLang="en-US" smtClean="0"/>
+              <a:rPr lang="zh-TW" altLang="en-US"/>
               <a:t>第五層</a:t>
             </a:r>
-            <a:endParaRPr lang="zh-TW" altLang="en-US"/>
           </a:p>
         </p:txBody>
       </p:sp>
@@ -416,7 +434,7 @@
           <a:p>
             <a:fld id="{12E7C0A1-DC17-44F8-A960-0280B3DAE314}" type="datetimeFigureOut">
               <a:rPr lang="zh-TW" altLang="en-US" smtClean="0"/>
-              <a:t>2018/10/15</a:t>
+              <a:t>2018/10/27</a:t>
             </a:fld>
             <a:endParaRPr lang="zh-TW" altLang="en-US"/>
           </a:p>
@@ -515,10 +533,9 @@
           <a:lstStyle/>
           <a:p>
             <a:r>
-              <a:rPr lang="zh-TW" altLang="en-US" smtClean="0"/>
+              <a:rPr lang="zh-TW" altLang="en-US"/>
               <a:t>按一下以編輯母片標題樣式</a:t>
             </a:r>
-            <a:endParaRPr lang="zh-TW" altLang="en-US"/>
           </a:p>
         </p:txBody>
       </p:sp>
@@ -544,38 +561,37 @@
           <a:p>
             <a:pPr lvl="0"/>
             <a:r>
-              <a:rPr lang="zh-TW" altLang="en-US" smtClean="0"/>
+              <a:rPr lang="zh-TW" altLang="en-US"/>
               <a:t>編輯母片文字樣式</a:t>
             </a:r>
           </a:p>
           <a:p>
             <a:pPr lvl="1"/>
             <a:r>
-              <a:rPr lang="zh-TW" altLang="en-US" smtClean="0"/>
+              <a:rPr lang="zh-TW" altLang="en-US"/>
               <a:t>第二層</a:t>
             </a:r>
           </a:p>
           <a:p>
             <a:pPr lvl="2"/>
             <a:r>
-              <a:rPr lang="zh-TW" altLang="en-US" smtClean="0"/>
+              <a:rPr lang="zh-TW" altLang="en-US"/>
               <a:t>第三層</a:t>
             </a:r>
           </a:p>
           <a:p>
             <a:pPr lvl="3"/>
             <a:r>
-              <a:rPr lang="zh-TW" altLang="en-US" smtClean="0"/>
+              <a:rPr lang="zh-TW" altLang="en-US"/>
               <a:t>第四層</a:t>
             </a:r>
           </a:p>
           <a:p>
             <a:pPr lvl="4"/>
             <a:r>
-              <a:rPr lang="zh-TW" altLang="en-US" smtClean="0"/>
+              <a:rPr lang="zh-TW" altLang="en-US"/>
               <a:t>第五層</a:t>
             </a:r>
-            <a:endParaRPr lang="zh-TW" altLang="en-US"/>
           </a:p>
         </p:txBody>
       </p:sp>
@@ -596,7 +612,7 @@
           <a:p>
             <a:fld id="{12E7C0A1-DC17-44F8-A960-0280B3DAE314}" type="datetimeFigureOut">
               <a:rPr lang="zh-TW" altLang="en-US" smtClean="0"/>
-              <a:t>2018/10/15</a:t>
+              <a:t>2018/10/27</a:t>
             </a:fld>
             <a:endParaRPr lang="zh-TW" altLang="en-US"/>
           </a:p>
@@ -690,10 +706,9 @@
           <a:lstStyle/>
           <a:p>
             <a:r>
-              <a:rPr lang="zh-TW" altLang="en-US" smtClean="0"/>
+              <a:rPr lang="zh-TW" altLang="en-US"/>
               <a:t>按一下以編輯母片標題樣式</a:t>
             </a:r>
-            <a:endParaRPr lang="zh-TW" altLang="en-US"/>
           </a:p>
         </p:txBody>
       </p:sp>
@@ -714,38 +729,37 @@
           <a:p>
             <a:pPr lvl="0"/>
             <a:r>
-              <a:rPr lang="zh-TW" altLang="en-US" smtClean="0"/>
+              <a:rPr lang="zh-TW" altLang="en-US"/>
               <a:t>編輯母片文字樣式</a:t>
             </a:r>
           </a:p>
           <a:p>
             <a:pPr lvl="1"/>
             <a:r>
-              <a:rPr lang="zh-TW" altLang="en-US" smtClean="0"/>
+              <a:rPr lang="zh-TW" altLang="en-US"/>
               <a:t>第二層</a:t>
             </a:r>
           </a:p>
           <a:p>
             <a:pPr lvl="2"/>
             <a:r>
-              <a:rPr lang="zh-TW" altLang="en-US" smtClean="0"/>
+              <a:rPr lang="zh-TW" altLang="en-US"/>
               <a:t>第三層</a:t>
             </a:r>
           </a:p>
           <a:p>
             <a:pPr lvl="3"/>
             <a:r>
-              <a:rPr lang="zh-TW" altLang="en-US" smtClean="0"/>
+              <a:rPr lang="zh-TW" altLang="en-US"/>
               <a:t>第四層</a:t>
             </a:r>
           </a:p>
           <a:p>
             <a:pPr lvl="4"/>
             <a:r>
-              <a:rPr lang="zh-TW" altLang="en-US" smtClean="0"/>
+              <a:rPr lang="zh-TW" altLang="en-US"/>
               <a:t>第五層</a:t>
             </a:r>
-            <a:endParaRPr lang="zh-TW" altLang="en-US"/>
           </a:p>
         </p:txBody>
       </p:sp>
@@ -766,7 +780,7 @@
           <a:p>
             <a:fld id="{12E7C0A1-DC17-44F8-A960-0280B3DAE314}" type="datetimeFigureOut">
               <a:rPr lang="zh-TW" altLang="en-US" smtClean="0"/>
-              <a:t>2018/10/15</a:t>
+              <a:t>2018/10/27</a:t>
             </a:fld>
             <a:endParaRPr lang="zh-TW" altLang="en-US"/>
           </a:p>
@@ -869,10 +883,9 @@
           </a:lstStyle>
           <a:p>
             <a:r>
-              <a:rPr lang="zh-TW" altLang="en-US" smtClean="0"/>
+              <a:rPr lang="zh-TW" altLang="en-US"/>
               <a:t>按一下以編輯母片標題樣式</a:t>
             </a:r>
-            <a:endParaRPr lang="zh-TW" altLang="en-US"/>
           </a:p>
         </p:txBody>
       </p:sp>
@@ -989,7 +1002,7 @@
           <a:p>
             <a:pPr lvl="0"/>
             <a:r>
-              <a:rPr lang="zh-TW" altLang="en-US" smtClean="0"/>
+              <a:rPr lang="zh-TW" altLang="en-US"/>
               <a:t>編輯母片文字樣式</a:t>
             </a:r>
           </a:p>
@@ -1012,7 +1025,7 @@
           <a:p>
             <a:fld id="{12E7C0A1-DC17-44F8-A960-0280B3DAE314}" type="datetimeFigureOut">
               <a:rPr lang="zh-TW" altLang="en-US" smtClean="0"/>
-              <a:t>2018/10/15</a:t>
+              <a:t>2018/10/27</a:t>
             </a:fld>
             <a:endParaRPr lang="zh-TW" altLang="en-US"/>
           </a:p>
@@ -1106,10 +1119,9 @@
           <a:lstStyle/>
           <a:p>
             <a:r>
-              <a:rPr lang="zh-TW" altLang="en-US" smtClean="0"/>
+              <a:rPr lang="zh-TW" altLang="en-US"/>
               <a:t>按一下以編輯母片標題樣式</a:t>
             </a:r>
-            <a:endParaRPr lang="zh-TW" altLang="en-US"/>
           </a:p>
         </p:txBody>
       </p:sp>
@@ -1135,38 +1147,37 @@
           <a:p>
             <a:pPr lvl="0"/>
             <a:r>
-              <a:rPr lang="zh-TW" altLang="en-US" smtClean="0"/>
+              <a:rPr lang="zh-TW" altLang="en-US"/>
               <a:t>編輯母片文字樣式</a:t>
             </a:r>
           </a:p>
           <a:p>
             <a:pPr lvl="1"/>
             <a:r>
-              <a:rPr lang="zh-TW" altLang="en-US" smtClean="0"/>
+              <a:rPr lang="zh-TW" altLang="en-US"/>
               <a:t>第二層</a:t>
             </a:r>
           </a:p>
           <a:p>
             <a:pPr lvl="2"/>
             <a:r>
-              <a:rPr lang="zh-TW" altLang="en-US" smtClean="0"/>
+              <a:rPr lang="zh-TW" altLang="en-US"/>
               <a:t>第三層</a:t>
             </a:r>
           </a:p>
           <a:p>
             <a:pPr lvl="3"/>
             <a:r>
-              <a:rPr lang="zh-TW" altLang="en-US" smtClean="0"/>
+              <a:rPr lang="zh-TW" altLang="en-US"/>
               <a:t>第四層</a:t>
             </a:r>
           </a:p>
           <a:p>
             <a:pPr lvl="4"/>
             <a:r>
-              <a:rPr lang="zh-TW" altLang="en-US" smtClean="0"/>
+              <a:rPr lang="zh-TW" altLang="en-US"/>
               <a:t>第五層</a:t>
             </a:r>
-            <a:endParaRPr lang="zh-TW" altLang="en-US"/>
           </a:p>
         </p:txBody>
       </p:sp>
@@ -1192,38 +1203,37 @@
           <a:p>
             <a:pPr lvl="0"/>
             <a:r>
-              <a:rPr lang="zh-TW" altLang="en-US" smtClean="0"/>
+              <a:rPr lang="zh-TW" altLang="en-US"/>
               <a:t>編輯母片文字樣式</a:t>
             </a:r>
           </a:p>
           <a:p>
             <a:pPr lvl="1"/>
             <a:r>
-              <a:rPr lang="zh-TW" altLang="en-US" smtClean="0"/>
+              <a:rPr lang="zh-TW" altLang="en-US"/>
               <a:t>第二層</a:t>
             </a:r>
           </a:p>
           <a:p>
             <a:pPr lvl="2"/>
             <a:r>
-              <a:rPr lang="zh-TW" altLang="en-US" smtClean="0"/>
+              <a:rPr lang="zh-TW" altLang="en-US"/>
               <a:t>第三層</a:t>
             </a:r>
           </a:p>
           <a:p>
             <a:pPr lvl="3"/>
             <a:r>
-              <a:rPr lang="zh-TW" altLang="en-US" smtClean="0"/>
+              <a:rPr lang="zh-TW" altLang="en-US"/>
               <a:t>第四層</a:t>
             </a:r>
           </a:p>
           <a:p>
             <a:pPr lvl="4"/>
             <a:r>
-              <a:rPr lang="zh-TW" altLang="en-US" smtClean="0"/>
+              <a:rPr lang="zh-TW" altLang="en-US"/>
               <a:t>第五層</a:t>
             </a:r>
-            <a:endParaRPr lang="zh-TW" altLang="en-US"/>
           </a:p>
         </p:txBody>
       </p:sp>
@@ -1244,7 +1254,7 @@
           <a:p>
             <a:fld id="{12E7C0A1-DC17-44F8-A960-0280B3DAE314}" type="datetimeFigureOut">
               <a:rPr lang="zh-TW" altLang="en-US" smtClean="0"/>
-              <a:t>2018/10/15</a:t>
+              <a:t>2018/10/27</a:t>
             </a:fld>
             <a:endParaRPr lang="zh-TW" altLang="en-US"/>
           </a:p>
@@ -1343,10 +1353,9 @@
           <a:lstStyle/>
           <a:p>
             <a:r>
-              <a:rPr lang="zh-TW" altLang="en-US" smtClean="0"/>
+              <a:rPr lang="zh-TW" altLang="en-US"/>
               <a:t>按一下以編輯母片標題樣式</a:t>
             </a:r>
-            <a:endParaRPr lang="zh-TW" altLang="en-US"/>
           </a:p>
         </p:txBody>
       </p:sp>
@@ -1409,7 +1418,7 @@
           <a:p>
             <a:pPr lvl="0"/>
             <a:r>
-              <a:rPr lang="zh-TW" altLang="en-US" smtClean="0"/>
+              <a:rPr lang="zh-TW" altLang="en-US"/>
               <a:t>編輯母片文字樣式</a:t>
             </a:r>
           </a:p>
@@ -1437,38 +1446,37 @@
           <a:p>
             <a:pPr lvl="0"/>
             <a:r>
-              <a:rPr lang="zh-TW" altLang="en-US" smtClean="0"/>
+              <a:rPr lang="zh-TW" altLang="en-US"/>
               <a:t>編輯母片文字樣式</a:t>
             </a:r>
           </a:p>
           <a:p>
             <a:pPr lvl="1"/>
             <a:r>
-              <a:rPr lang="zh-TW" altLang="en-US" smtClean="0"/>
+              <a:rPr lang="zh-TW" altLang="en-US"/>
               <a:t>第二層</a:t>
             </a:r>
           </a:p>
           <a:p>
             <a:pPr lvl="2"/>
             <a:r>
-              <a:rPr lang="zh-TW" altLang="en-US" smtClean="0"/>
+              <a:rPr lang="zh-TW" altLang="en-US"/>
               <a:t>第三層</a:t>
             </a:r>
           </a:p>
           <a:p>
             <a:pPr lvl="3"/>
             <a:r>
-              <a:rPr lang="zh-TW" altLang="en-US" smtClean="0"/>
+              <a:rPr lang="zh-TW" altLang="en-US"/>
               <a:t>第四層</a:t>
             </a:r>
           </a:p>
           <a:p>
             <a:pPr lvl="4"/>
             <a:r>
-              <a:rPr lang="zh-TW" altLang="en-US" smtClean="0"/>
+              <a:rPr lang="zh-TW" altLang="en-US"/>
               <a:t>第五層</a:t>
             </a:r>
-            <a:endParaRPr lang="zh-TW" altLang="en-US"/>
           </a:p>
         </p:txBody>
       </p:sp>
@@ -1531,7 +1539,7 @@
           <a:p>
             <a:pPr lvl="0"/>
             <a:r>
-              <a:rPr lang="zh-TW" altLang="en-US" smtClean="0"/>
+              <a:rPr lang="zh-TW" altLang="en-US"/>
               <a:t>編輯母片文字樣式</a:t>
             </a:r>
           </a:p>
@@ -1559,38 +1567,37 @@
           <a:p>
             <a:pPr lvl="0"/>
             <a:r>
-              <a:rPr lang="zh-TW" altLang="en-US" smtClean="0"/>
+              <a:rPr lang="zh-TW" altLang="en-US"/>
               <a:t>編輯母片文字樣式</a:t>
             </a:r>
           </a:p>
           <a:p>
             <a:pPr lvl="1"/>
             <a:r>
-              <a:rPr lang="zh-TW" altLang="en-US" smtClean="0"/>
+              <a:rPr lang="zh-TW" altLang="en-US"/>
               <a:t>第二層</a:t>
             </a:r>
           </a:p>
           <a:p>
             <a:pPr lvl="2"/>
             <a:r>
-              <a:rPr lang="zh-TW" altLang="en-US" smtClean="0"/>
+              <a:rPr lang="zh-TW" altLang="en-US"/>
               <a:t>第三層</a:t>
             </a:r>
           </a:p>
           <a:p>
             <a:pPr lvl="3"/>
             <a:r>
-              <a:rPr lang="zh-TW" altLang="en-US" smtClean="0"/>
+              <a:rPr lang="zh-TW" altLang="en-US"/>
               <a:t>第四層</a:t>
             </a:r>
           </a:p>
           <a:p>
             <a:pPr lvl="4"/>
             <a:r>
-              <a:rPr lang="zh-TW" altLang="en-US" smtClean="0"/>
+              <a:rPr lang="zh-TW" altLang="en-US"/>
               <a:t>第五層</a:t>
             </a:r>
-            <a:endParaRPr lang="zh-TW" altLang="en-US"/>
           </a:p>
         </p:txBody>
       </p:sp>
@@ -1611,7 +1618,7 @@
           <a:p>
             <a:fld id="{12E7C0A1-DC17-44F8-A960-0280B3DAE314}" type="datetimeFigureOut">
               <a:rPr lang="zh-TW" altLang="en-US" smtClean="0"/>
-              <a:t>2018/10/15</a:t>
+              <a:t>2018/10/27</a:t>
             </a:fld>
             <a:endParaRPr lang="zh-TW" altLang="en-US"/>
           </a:p>
@@ -1705,10 +1712,9 @@
           <a:lstStyle/>
           <a:p>
             <a:r>
-              <a:rPr lang="zh-TW" altLang="en-US" smtClean="0"/>
+              <a:rPr lang="zh-TW" altLang="en-US"/>
               <a:t>按一下以編輯母片標題樣式</a:t>
             </a:r>
-            <a:endParaRPr lang="zh-TW" altLang="en-US"/>
           </a:p>
         </p:txBody>
       </p:sp>
@@ -1729,7 +1735,7 @@
           <a:p>
             <a:fld id="{12E7C0A1-DC17-44F8-A960-0280B3DAE314}" type="datetimeFigureOut">
               <a:rPr lang="zh-TW" altLang="en-US" smtClean="0"/>
-              <a:t>2018/10/15</a:t>
+              <a:t>2018/10/27</a:t>
             </a:fld>
             <a:endParaRPr lang="zh-TW" altLang="en-US"/>
           </a:p>
@@ -1824,7 +1830,7 @@
           <a:p>
             <a:fld id="{12E7C0A1-DC17-44F8-A960-0280B3DAE314}" type="datetimeFigureOut">
               <a:rPr lang="zh-TW" altLang="en-US" smtClean="0"/>
-              <a:t>2018/10/15</a:t>
+              <a:t>2018/10/27</a:t>
             </a:fld>
             <a:endParaRPr lang="zh-TW" altLang="en-US"/>
           </a:p>
@@ -1927,10 +1933,9 @@
           </a:lstStyle>
           <a:p>
             <a:r>
-              <a:rPr lang="zh-TW" altLang="en-US" smtClean="0"/>
+              <a:rPr lang="zh-TW" altLang="en-US"/>
               <a:t>按一下以編輯母片標題樣式</a:t>
             </a:r>
-            <a:endParaRPr lang="zh-TW" altLang="en-US"/>
           </a:p>
         </p:txBody>
       </p:sp>
@@ -1984,38 +1989,37 @@
           <a:p>
             <a:pPr lvl="0"/>
             <a:r>
-              <a:rPr lang="zh-TW" altLang="en-US" smtClean="0"/>
+              <a:rPr lang="zh-TW" altLang="en-US"/>
               <a:t>編輯母片文字樣式</a:t>
             </a:r>
           </a:p>
           <a:p>
             <a:pPr lvl="1"/>
             <a:r>
-              <a:rPr lang="zh-TW" altLang="en-US" smtClean="0"/>
+              <a:rPr lang="zh-TW" altLang="en-US"/>
               <a:t>第二層</a:t>
             </a:r>
           </a:p>
           <a:p>
             <a:pPr lvl="2"/>
             <a:r>
-              <a:rPr lang="zh-TW" altLang="en-US" smtClean="0"/>
+              <a:rPr lang="zh-TW" altLang="en-US"/>
               <a:t>第三層</a:t>
             </a:r>
           </a:p>
           <a:p>
             <a:pPr lvl="3"/>
             <a:r>
-              <a:rPr lang="zh-TW" altLang="en-US" smtClean="0"/>
+              <a:rPr lang="zh-TW" altLang="en-US"/>
               <a:t>第四層</a:t>
             </a:r>
           </a:p>
           <a:p>
             <a:pPr lvl="4"/>
             <a:r>
-              <a:rPr lang="zh-TW" altLang="en-US" smtClean="0"/>
+              <a:rPr lang="zh-TW" altLang="en-US"/>
               <a:t>第五層</a:t>
             </a:r>
-            <a:endParaRPr lang="zh-TW" altLang="en-US"/>
           </a:p>
         </p:txBody>
       </p:sp>
@@ -2078,7 +2082,7 @@
           <a:p>
             <a:pPr lvl="0"/>
             <a:r>
-              <a:rPr lang="zh-TW" altLang="en-US" smtClean="0"/>
+              <a:rPr lang="zh-TW" altLang="en-US"/>
               <a:t>編輯母片文字樣式</a:t>
             </a:r>
           </a:p>
@@ -2101,7 +2105,7 @@
           <a:p>
             <a:fld id="{12E7C0A1-DC17-44F8-A960-0280B3DAE314}" type="datetimeFigureOut">
               <a:rPr lang="zh-TW" altLang="en-US" smtClean="0"/>
-              <a:t>2018/10/15</a:t>
+              <a:t>2018/10/27</a:t>
             </a:fld>
             <a:endParaRPr lang="zh-TW" altLang="en-US"/>
           </a:p>
@@ -2204,10 +2208,9 @@
           </a:lstStyle>
           <a:p>
             <a:r>
-              <a:rPr lang="zh-TW" altLang="en-US" smtClean="0"/>
+              <a:rPr lang="zh-TW" altLang="en-US"/>
               <a:t>按一下以編輯母片標題樣式</a:t>
             </a:r>
-            <a:endParaRPr lang="zh-TW" altLang="en-US"/>
           </a:p>
         </p:txBody>
       </p:sp>
@@ -2331,7 +2334,7 @@
           <a:p>
             <a:pPr lvl="0"/>
             <a:r>
-              <a:rPr lang="zh-TW" altLang="en-US" smtClean="0"/>
+              <a:rPr lang="zh-TW" altLang="en-US"/>
               <a:t>編輯母片文字樣式</a:t>
             </a:r>
           </a:p>
@@ -2354,7 +2357,7 @@
           <a:p>
             <a:fld id="{12E7C0A1-DC17-44F8-A960-0280B3DAE314}" type="datetimeFigureOut">
               <a:rPr lang="zh-TW" altLang="en-US" smtClean="0"/>
-              <a:t>2018/10/15</a:t>
+              <a:t>2018/10/27</a:t>
             </a:fld>
             <a:endParaRPr lang="zh-TW" altLang="en-US"/>
           </a:p>
@@ -2463,10 +2466,9 @@
           <a:lstStyle/>
           <a:p>
             <a:r>
-              <a:rPr lang="zh-TW" altLang="en-US" smtClean="0"/>
+              <a:rPr lang="zh-TW" altLang="en-US"/>
               <a:t>按一下以編輯母片標題樣式</a:t>
             </a:r>
-            <a:endParaRPr lang="zh-TW" altLang="en-US"/>
           </a:p>
         </p:txBody>
       </p:sp>
@@ -2497,38 +2499,37 @@
           <a:p>
             <a:pPr lvl="0"/>
             <a:r>
-              <a:rPr lang="zh-TW" altLang="en-US" smtClean="0"/>
+              <a:rPr lang="zh-TW" altLang="en-US"/>
               <a:t>編輯母片文字樣式</a:t>
             </a:r>
           </a:p>
           <a:p>
             <a:pPr lvl="1"/>
             <a:r>
-              <a:rPr lang="zh-TW" altLang="en-US" smtClean="0"/>
+              <a:rPr lang="zh-TW" altLang="en-US"/>
               <a:t>第二層</a:t>
             </a:r>
           </a:p>
           <a:p>
             <a:pPr lvl="2"/>
             <a:r>
-              <a:rPr lang="zh-TW" altLang="en-US" smtClean="0"/>
+              <a:rPr lang="zh-TW" altLang="en-US"/>
               <a:t>第三層</a:t>
             </a:r>
           </a:p>
           <a:p>
             <a:pPr lvl="3"/>
             <a:r>
-              <a:rPr lang="zh-TW" altLang="en-US" smtClean="0"/>
+              <a:rPr lang="zh-TW" altLang="en-US"/>
               <a:t>第四層</a:t>
             </a:r>
           </a:p>
           <a:p>
             <a:pPr lvl="4"/>
             <a:r>
-              <a:rPr lang="zh-TW" altLang="en-US" smtClean="0"/>
+              <a:rPr lang="zh-TW" altLang="en-US"/>
               <a:t>第五層</a:t>
             </a:r>
-            <a:endParaRPr lang="zh-TW" altLang="en-US"/>
           </a:p>
         </p:txBody>
       </p:sp>
@@ -2567,7 +2568,7 @@
           <a:p>
             <a:fld id="{12E7C0A1-DC17-44F8-A960-0280B3DAE314}" type="datetimeFigureOut">
               <a:rPr lang="zh-TW" altLang="en-US" smtClean="0"/>
-              <a:t>2018/10/15</a:t>
+              <a:t>2018/10/27</a:t>
             </a:fld>
             <a:endParaRPr lang="zh-TW" altLang="en-US"/>
           </a:p>
@@ -2974,6 +2975,1498 @@
       </p:grpSpPr>
       <p:pic>
         <p:nvPicPr>
+          <p:cNvPr id="3" name="圖片 2">
+            <a:extLst>
+              <a:ext uri="{FF2B5EF4-FFF2-40B4-BE49-F238E27FC236}">
+                <a16:creationId xmlns:a16="http://schemas.microsoft.com/office/drawing/2014/main" id="{505A8690-D44D-4E20-B077-E154B61F2D2B}"/>
+              </a:ext>
+            </a:extLst>
+          </p:cNvPr>
+          <p:cNvPicPr>
+            <a:picLocks noChangeAspect="1"/>
+          </p:cNvPicPr>
+          <p:nvPr/>
+        </p:nvPicPr>
+        <p:blipFill>
+          <a:blip r:embed="rId2">
+            <a:extLst>
+              <a:ext uri="{28A0092B-C50C-407E-A947-70E740481C1C}">
+                <a14:useLocalDpi xmlns:a14="http://schemas.microsoft.com/office/drawing/2010/main" val="0"/>
+              </a:ext>
+            </a:extLst>
+          </a:blip>
+          <a:stretch>
+            <a:fillRect/>
+          </a:stretch>
+        </p:blipFill>
+        <p:spPr>
+          <a:xfrm>
+            <a:off x="1988645" y="0"/>
+            <a:ext cx="8214709" cy="6858000"/>
+          </a:xfrm>
+          <a:prstGeom prst="rect">
+            <a:avLst/>
+          </a:prstGeom>
+        </p:spPr>
+      </p:pic>
+      <p:sp>
+        <p:nvSpPr>
+          <p:cNvPr id="4" name="矩形 3">
+            <a:extLst>
+              <a:ext uri="{FF2B5EF4-FFF2-40B4-BE49-F238E27FC236}">
+                <a16:creationId xmlns:a16="http://schemas.microsoft.com/office/drawing/2014/main" id="{AE1FAF08-0235-41CE-9ABE-BADA94A63A52}"/>
+              </a:ext>
+            </a:extLst>
+          </p:cNvPr>
+          <p:cNvSpPr/>
+          <p:nvPr/>
+        </p:nvSpPr>
+        <p:spPr>
+          <a:xfrm>
+            <a:off x="2941162" y="358218"/>
+            <a:ext cx="1530000" cy="270000"/>
+          </a:xfrm>
+          <a:prstGeom prst="rect">
+            <a:avLst/>
+          </a:prstGeom>
+          <a:noFill/>
+          <a:ln w="38100">
+            <a:solidFill>
+              <a:srgbClr val="FF0000"/>
+            </a:solidFill>
+          </a:ln>
+        </p:spPr>
+        <p:style>
+          <a:lnRef idx="2">
+            <a:schemeClr val="accent1">
+              <a:shade val="50000"/>
+            </a:schemeClr>
+          </a:lnRef>
+          <a:fillRef idx="1">
+            <a:schemeClr val="accent1"/>
+          </a:fillRef>
+          <a:effectRef idx="0">
+            <a:schemeClr val="accent1"/>
+          </a:effectRef>
+          <a:fontRef idx="minor">
+            <a:schemeClr val="lt1"/>
+          </a:fontRef>
+        </p:style>
+        <p:txBody>
+          <a:bodyPr rtlCol="0" anchor="ctr"/>
+          <a:lstStyle/>
+          <a:p>
+            <a:pPr algn="ctr"/>
+            <a:endParaRPr lang="zh-TW" altLang="en-US"/>
+          </a:p>
+        </p:txBody>
+      </p:sp>
+      <p:sp>
+        <p:nvSpPr>
+          <p:cNvPr id="5" name="矩形 4">
+            <a:extLst>
+              <a:ext uri="{FF2B5EF4-FFF2-40B4-BE49-F238E27FC236}">
+                <a16:creationId xmlns:a16="http://schemas.microsoft.com/office/drawing/2014/main" id="{E751DB2D-9715-4FF0-AE13-503A6AD3F760}"/>
+              </a:ext>
+            </a:extLst>
+          </p:cNvPr>
+          <p:cNvSpPr/>
+          <p:nvPr/>
+        </p:nvSpPr>
+        <p:spPr>
+          <a:xfrm>
+            <a:off x="3912119" y="2969441"/>
+            <a:ext cx="2160000" cy="810000"/>
+          </a:xfrm>
+          <a:prstGeom prst="rect">
+            <a:avLst/>
+          </a:prstGeom>
+          <a:noFill/>
+          <a:ln w="38100">
+            <a:solidFill>
+              <a:srgbClr val="FF0000"/>
+            </a:solidFill>
+          </a:ln>
+        </p:spPr>
+        <p:style>
+          <a:lnRef idx="2">
+            <a:schemeClr val="accent1">
+              <a:shade val="50000"/>
+            </a:schemeClr>
+          </a:lnRef>
+          <a:fillRef idx="1">
+            <a:schemeClr val="accent1"/>
+          </a:fillRef>
+          <a:effectRef idx="0">
+            <a:schemeClr val="accent1"/>
+          </a:effectRef>
+          <a:fontRef idx="minor">
+            <a:schemeClr val="lt1"/>
+          </a:fontRef>
+        </p:style>
+        <p:txBody>
+          <a:bodyPr rtlCol="0" anchor="ctr"/>
+          <a:lstStyle/>
+          <a:p>
+            <a:pPr algn="ctr"/>
+            <a:endParaRPr lang="zh-TW" altLang="en-US"/>
+          </a:p>
+        </p:txBody>
+      </p:sp>
+    </p:spTree>
+    <p:extLst>
+      <p:ext uri="{BB962C8B-B14F-4D97-AF65-F5344CB8AC3E}">
+        <p14:creationId xmlns:p14="http://schemas.microsoft.com/office/powerpoint/2010/main" val="3606167621"/>
+      </p:ext>
+    </p:extLst>
+  </p:cSld>
+  <p:clrMapOvr>
+    <a:masterClrMapping/>
+  </p:clrMapOvr>
+</p:sld>
+</file>
+
+<file path=ppt/slides/slide10.xml><?xml version="1.0" encoding="utf-8"?>
+<p:sld xmlns:a="http://schemas.openxmlformats.org/drawingml/2006/main" xmlns:r="http://schemas.openxmlformats.org/officeDocument/2006/relationships" xmlns:p="http://schemas.openxmlformats.org/presentationml/2006/main">
+  <p:cSld>
+    <p:spTree>
+      <p:nvGrpSpPr>
+        <p:cNvPr id="1" name=""/>
+        <p:cNvGrpSpPr/>
+        <p:nvPr/>
+      </p:nvGrpSpPr>
+      <p:grpSpPr>
+        <a:xfrm>
+          <a:off x="0" y="0"/>
+          <a:ext cx="0" cy="0"/>
+          <a:chOff x="0" y="0"/>
+          <a:chExt cx="0" cy="0"/>
+        </a:xfrm>
+      </p:grpSpPr>
+      <p:pic>
+        <p:nvPicPr>
+          <p:cNvPr id="3" name="圖片 2">
+            <a:extLst>
+              <a:ext uri="{FF2B5EF4-FFF2-40B4-BE49-F238E27FC236}">
+                <a16:creationId xmlns:a16="http://schemas.microsoft.com/office/drawing/2014/main" id="{356FEF21-6B16-49DB-B362-7DE1FF258959}"/>
+              </a:ext>
+            </a:extLst>
+          </p:cNvPr>
+          <p:cNvPicPr>
+            <a:picLocks noChangeAspect="1"/>
+          </p:cNvPicPr>
+          <p:nvPr/>
+        </p:nvPicPr>
+        <p:blipFill>
+          <a:blip r:embed="rId2">
+            <a:extLst>
+              <a:ext uri="{28A0092B-C50C-407E-A947-70E740481C1C}">
+                <a14:useLocalDpi xmlns:a14="http://schemas.microsoft.com/office/drawing/2010/main" val="0"/>
+              </a:ext>
+            </a:extLst>
+          </a:blip>
+          <a:stretch>
+            <a:fillRect/>
+          </a:stretch>
+        </p:blipFill>
+        <p:spPr>
+          <a:xfrm>
+            <a:off x="1468139" y="0"/>
+            <a:ext cx="9255722" cy="6858000"/>
+          </a:xfrm>
+          <a:prstGeom prst="rect">
+            <a:avLst/>
+          </a:prstGeom>
+        </p:spPr>
+      </p:pic>
+      <p:sp>
+        <p:nvSpPr>
+          <p:cNvPr id="4" name="矩形 3">
+            <a:extLst>
+              <a:ext uri="{FF2B5EF4-FFF2-40B4-BE49-F238E27FC236}">
+                <a16:creationId xmlns:a16="http://schemas.microsoft.com/office/drawing/2014/main" id="{BA8BE4AB-EFA4-44F9-9F06-A4408EC44DF0}"/>
+              </a:ext>
+            </a:extLst>
+          </p:cNvPr>
+          <p:cNvSpPr/>
+          <p:nvPr/>
+        </p:nvSpPr>
+        <p:spPr>
+          <a:xfrm>
+            <a:off x="2752624" y="613914"/>
+            <a:ext cx="3870000" cy="270000"/>
+          </a:xfrm>
+          <a:prstGeom prst="rect">
+            <a:avLst/>
+          </a:prstGeom>
+          <a:noFill/>
+          <a:ln w="38100">
+            <a:solidFill>
+              <a:srgbClr val="FF0000"/>
+            </a:solidFill>
+          </a:ln>
+        </p:spPr>
+        <p:style>
+          <a:lnRef idx="2">
+            <a:schemeClr val="accent1">
+              <a:shade val="50000"/>
+            </a:schemeClr>
+          </a:lnRef>
+          <a:fillRef idx="1">
+            <a:schemeClr val="accent1"/>
+          </a:fillRef>
+          <a:effectRef idx="0">
+            <a:schemeClr val="accent1"/>
+          </a:effectRef>
+          <a:fontRef idx="minor">
+            <a:schemeClr val="lt1"/>
+          </a:fontRef>
+        </p:style>
+        <p:txBody>
+          <a:bodyPr rtlCol="0" anchor="ctr"/>
+          <a:lstStyle/>
+          <a:p>
+            <a:pPr algn="ctr"/>
+            <a:endParaRPr lang="zh-TW" altLang="en-US"/>
+          </a:p>
+        </p:txBody>
+      </p:sp>
+    </p:spTree>
+    <p:extLst>
+      <p:ext uri="{BB962C8B-B14F-4D97-AF65-F5344CB8AC3E}">
+        <p14:creationId xmlns:p14="http://schemas.microsoft.com/office/powerpoint/2010/main" val="1057414699"/>
+      </p:ext>
+    </p:extLst>
+  </p:cSld>
+  <p:clrMapOvr>
+    <a:masterClrMapping/>
+  </p:clrMapOvr>
+</p:sld>
+</file>
+
+<file path=ppt/slides/slide11.xml><?xml version="1.0" encoding="utf-8"?>
+<p:sld xmlns:a="http://schemas.openxmlformats.org/drawingml/2006/main" xmlns:r="http://schemas.openxmlformats.org/officeDocument/2006/relationships" xmlns:p="http://schemas.openxmlformats.org/presentationml/2006/main">
+  <p:cSld>
+    <p:spTree>
+      <p:nvGrpSpPr>
+        <p:cNvPr id="1" name=""/>
+        <p:cNvGrpSpPr/>
+        <p:nvPr/>
+      </p:nvGrpSpPr>
+      <p:grpSpPr>
+        <a:xfrm>
+          <a:off x="0" y="0"/>
+          <a:ext cx="0" cy="0"/>
+          <a:chOff x="0" y="0"/>
+          <a:chExt cx="0" cy="0"/>
+        </a:xfrm>
+      </p:grpSpPr>
+      <p:pic>
+        <p:nvPicPr>
+          <p:cNvPr id="3" name="圖片 2">
+            <a:extLst>
+              <a:ext uri="{FF2B5EF4-FFF2-40B4-BE49-F238E27FC236}">
+                <a16:creationId xmlns:a16="http://schemas.microsoft.com/office/drawing/2014/main" id="{E3B6FC23-20AD-44EA-990B-5917EDA6F00E}"/>
+              </a:ext>
+            </a:extLst>
+          </p:cNvPr>
+          <p:cNvPicPr>
+            <a:picLocks noChangeAspect="1"/>
+          </p:cNvPicPr>
+          <p:nvPr/>
+        </p:nvPicPr>
+        <p:blipFill>
+          <a:blip r:embed="rId2">
+            <a:extLst>
+              <a:ext uri="{28A0092B-C50C-407E-A947-70E740481C1C}">
+                <a14:useLocalDpi xmlns:a14="http://schemas.microsoft.com/office/drawing/2010/main" val="0"/>
+              </a:ext>
+            </a:extLst>
+          </a:blip>
+          <a:stretch>
+            <a:fillRect/>
+          </a:stretch>
+        </p:blipFill>
+        <p:spPr>
+          <a:xfrm>
+            <a:off x="609600" y="0"/>
+            <a:ext cx="10972800" cy="6858000"/>
+          </a:xfrm>
+          <a:prstGeom prst="rect">
+            <a:avLst/>
+          </a:prstGeom>
+        </p:spPr>
+      </p:pic>
+      <p:sp>
+        <p:nvSpPr>
+          <p:cNvPr id="4" name="矩形 3">
+            <a:extLst>
+              <a:ext uri="{FF2B5EF4-FFF2-40B4-BE49-F238E27FC236}">
+                <a16:creationId xmlns:a16="http://schemas.microsoft.com/office/drawing/2014/main" id="{A83C3B6A-4031-44D4-8756-A9555F4DC441}"/>
+              </a:ext>
+            </a:extLst>
+          </p:cNvPr>
+          <p:cNvSpPr/>
+          <p:nvPr/>
+        </p:nvSpPr>
+        <p:spPr>
+          <a:xfrm>
+            <a:off x="609600" y="6498000"/>
+            <a:ext cx="360000" cy="360000"/>
+          </a:xfrm>
+          <a:prstGeom prst="rect">
+            <a:avLst/>
+          </a:prstGeom>
+          <a:noFill/>
+          <a:ln w="38100">
+            <a:solidFill>
+              <a:srgbClr val="FF0000"/>
+            </a:solidFill>
+          </a:ln>
+        </p:spPr>
+        <p:style>
+          <a:lnRef idx="2">
+            <a:schemeClr val="accent1">
+              <a:shade val="50000"/>
+            </a:schemeClr>
+          </a:lnRef>
+          <a:fillRef idx="1">
+            <a:schemeClr val="accent1"/>
+          </a:fillRef>
+          <a:effectRef idx="0">
+            <a:schemeClr val="accent1"/>
+          </a:effectRef>
+          <a:fontRef idx="minor">
+            <a:schemeClr val="lt1"/>
+          </a:fontRef>
+        </p:style>
+        <p:txBody>
+          <a:bodyPr rtlCol="0" anchor="ctr"/>
+          <a:lstStyle/>
+          <a:p>
+            <a:pPr algn="ctr"/>
+            <a:endParaRPr lang="zh-TW" altLang="en-US"/>
+          </a:p>
+        </p:txBody>
+      </p:sp>
+      <p:sp>
+        <p:nvSpPr>
+          <p:cNvPr id="5" name="矩形 4">
+            <a:extLst>
+              <a:ext uri="{FF2B5EF4-FFF2-40B4-BE49-F238E27FC236}">
+                <a16:creationId xmlns:a16="http://schemas.microsoft.com/office/drawing/2014/main" id="{F8900DD3-06D2-44E2-B3ED-B31EE32DF70A}"/>
+              </a:ext>
+            </a:extLst>
+          </p:cNvPr>
+          <p:cNvSpPr/>
+          <p:nvPr/>
+        </p:nvSpPr>
+        <p:spPr>
+          <a:xfrm>
+            <a:off x="1008665" y="2772655"/>
+            <a:ext cx="1980000" cy="360000"/>
+          </a:xfrm>
+          <a:prstGeom prst="rect">
+            <a:avLst/>
+          </a:prstGeom>
+          <a:noFill/>
+          <a:ln w="38100">
+            <a:solidFill>
+              <a:srgbClr val="FF0000"/>
+            </a:solidFill>
+          </a:ln>
+        </p:spPr>
+        <p:style>
+          <a:lnRef idx="2">
+            <a:schemeClr val="accent1">
+              <a:shade val="50000"/>
+            </a:schemeClr>
+          </a:lnRef>
+          <a:fillRef idx="1">
+            <a:schemeClr val="accent1"/>
+          </a:fillRef>
+          <a:effectRef idx="0">
+            <a:schemeClr val="accent1"/>
+          </a:effectRef>
+          <a:fontRef idx="minor">
+            <a:schemeClr val="lt1"/>
+          </a:fontRef>
+        </p:style>
+        <p:txBody>
+          <a:bodyPr rtlCol="0" anchor="ctr"/>
+          <a:lstStyle/>
+          <a:p>
+            <a:pPr algn="ctr"/>
+            <a:endParaRPr lang="zh-TW" altLang="en-US"/>
+          </a:p>
+        </p:txBody>
+      </p:sp>
+      <p:sp>
+        <p:nvSpPr>
+          <p:cNvPr id="6" name="矩形 5">
+            <a:extLst>
+              <a:ext uri="{FF2B5EF4-FFF2-40B4-BE49-F238E27FC236}">
+                <a16:creationId xmlns:a16="http://schemas.microsoft.com/office/drawing/2014/main" id="{318F7384-69ED-4CF6-86C2-B5821F9FD20E}"/>
+              </a:ext>
+            </a:extLst>
+          </p:cNvPr>
+          <p:cNvSpPr/>
+          <p:nvPr/>
+        </p:nvSpPr>
+        <p:spPr>
+          <a:xfrm>
+            <a:off x="1008665" y="4148969"/>
+            <a:ext cx="1980000" cy="360000"/>
+          </a:xfrm>
+          <a:prstGeom prst="rect">
+            <a:avLst/>
+          </a:prstGeom>
+          <a:noFill/>
+          <a:ln w="38100">
+            <a:solidFill>
+              <a:srgbClr val="FF0000"/>
+            </a:solidFill>
+          </a:ln>
+        </p:spPr>
+        <p:style>
+          <a:lnRef idx="2">
+            <a:schemeClr val="accent1">
+              <a:shade val="50000"/>
+            </a:schemeClr>
+          </a:lnRef>
+          <a:fillRef idx="1">
+            <a:schemeClr val="accent1"/>
+          </a:fillRef>
+          <a:effectRef idx="0">
+            <a:schemeClr val="accent1"/>
+          </a:effectRef>
+          <a:fontRef idx="minor">
+            <a:schemeClr val="lt1"/>
+          </a:fontRef>
+        </p:style>
+        <p:txBody>
+          <a:bodyPr rtlCol="0" anchor="ctr"/>
+          <a:lstStyle/>
+          <a:p>
+            <a:pPr algn="ctr"/>
+            <a:endParaRPr lang="zh-TW" altLang="en-US"/>
+          </a:p>
+        </p:txBody>
+      </p:sp>
+    </p:spTree>
+    <p:extLst>
+      <p:ext uri="{BB962C8B-B14F-4D97-AF65-F5344CB8AC3E}">
+        <p14:creationId xmlns:p14="http://schemas.microsoft.com/office/powerpoint/2010/main" val="4244025687"/>
+      </p:ext>
+    </p:extLst>
+  </p:cSld>
+  <p:clrMapOvr>
+    <a:masterClrMapping/>
+  </p:clrMapOvr>
+</p:sld>
+</file>
+
+<file path=ppt/slides/slide12.xml><?xml version="1.0" encoding="utf-8"?>
+<p:sld xmlns:a="http://schemas.openxmlformats.org/drawingml/2006/main" xmlns:r="http://schemas.openxmlformats.org/officeDocument/2006/relationships" xmlns:p="http://schemas.openxmlformats.org/presentationml/2006/main">
+  <p:cSld>
+    <p:spTree>
+      <p:nvGrpSpPr>
+        <p:cNvPr id="1" name=""/>
+        <p:cNvGrpSpPr/>
+        <p:nvPr/>
+      </p:nvGrpSpPr>
+      <p:grpSpPr>
+        <a:xfrm>
+          <a:off x="0" y="0"/>
+          <a:ext cx="0" cy="0"/>
+          <a:chOff x="0" y="0"/>
+          <a:chExt cx="0" cy="0"/>
+        </a:xfrm>
+      </p:grpSpPr>
+      <p:pic>
+        <p:nvPicPr>
+          <p:cNvPr id="3" name="圖片 2">
+            <a:extLst>
+              <a:ext uri="{FF2B5EF4-FFF2-40B4-BE49-F238E27FC236}">
+                <a16:creationId xmlns:a16="http://schemas.microsoft.com/office/drawing/2014/main" id="{ED58BEE4-B82B-4108-8D83-0B17CB1BB1CF}"/>
+              </a:ext>
+            </a:extLst>
+          </p:cNvPr>
+          <p:cNvPicPr>
+            <a:picLocks noChangeAspect="1"/>
+          </p:cNvPicPr>
+          <p:nvPr/>
+        </p:nvPicPr>
+        <p:blipFill>
+          <a:blip r:embed="rId2">
+            <a:extLst>
+              <a:ext uri="{28A0092B-C50C-407E-A947-70E740481C1C}">
+                <a14:useLocalDpi xmlns:a14="http://schemas.microsoft.com/office/drawing/2010/main" val="0"/>
+              </a:ext>
+            </a:extLst>
+          </a:blip>
+          <a:stretch>
+            <a:fillRect/>
+          </a:stretch>
+        </p:blipFill>
+        <p:spPr>
+          <a:xfrm>
+            <a:off x="2056836" y="532996"/>
+            <a:ext cx="8078327" cy="5792008"/>
+          </a:xfrm>
+          <a:prstGeom prst="rect">
+            <a:avLst/>
+          </a:prstGeom>
+        </p:spPr>
+      </p:pic>
+      <p:sp>
+        <p:nvSpPr>
+          <p:cNvPr id="4" name="矩形 3">
+            <a:extLst>
+              <a:ext uri="{FF2B5EF4-FFF2-40B4-BE49-F238E27FC236}">
+                <a16:creationId xmlns:a16="http://schemas.microsoft.com/office/drawing/2014/main" id="{AF839FB0-9631-47EA-9C7C-2FC741752091}"/>
+              </a:ext>
+            </a:extLst>
+          </p:cNvPr>
+          <p:cNvSpPr/>
+          <p:nvPr/>
+        </p:nvSpPr>
+        <p:spPr>
+          <a:xfrm>
+            <a:off x="3252244" y="1792267"/>
+            <a:ext cx="1080000" cy="270000"/>
+          </a:xfrm>
+          <a:prstGeom prst="rect">
+            <a:avLst/>
+          </a:prstGeom>
+          <a:noFill/>
+          <a:ln w="38100">
+            <a:solidFill>
+              <a:srgbClr val="FF0000"/>
+            </a:solidFill>
+          </a:ln>
+        </p:spPr>
+        <p:style>
+          <a:lnRef idx="2">
+            <a:schemeClr val="accent1">
+              <a:shade val="50000"/>
+            </a:schemeClr>
+          </a:lnRef>
+          <a:fillRef idx="1">
+            <a:schemeClr val="accent1"/>
+          </a:fillRef>
+          <a:effectRef idx="0">
+            <a:schemeClr val="accent1"/>
+          </a:effectRef>
+          <a:fontRef idx="minor">
+            <a:schemeClr val="lt1"/>
+          </a:fontRef>
+        </p:style>
+        <p:txBody>
+          <a:bodyPr rtlCol="0" anchor="ctr"/>
+          <a:lstStyle/>
+          <a:p>
+            <a:pPr algn="ctr"/>
+            <a:endParaRPr lang="zh-TW" altLang="en-US"/>
+          </a:p>
+        </p:txBody>
+      </p:sp>
+    </p:spTree>
+    <p:extLst>
+      <p:ext uri="{BB962C8B-B14F-4D97-AF65-F5344CB8AC3E}">
+        <p14:creationId xmlns:p14="http://schemas.microsoft.com/office/powerpoint/2010/main" val="4220933355"/>
+      </p:ext>
+    </p:extLst>
+  </p:cSld>
+  <p:clrMapOvr>
+    <a:masterClrMapping/>
+  </p:clrMapOvr>
+</p:sld>
+</file>
+
+<file path=ppt/slides/slide13.xml><?xml version="1.0" encoding="utf-8"?>
+<p:sld xmlns:a="http://schemas.openxmlformats.org/drawingml/2006/main" xmlns:r="http://schemas.openxmlformats.org/officeDocument/2006/relationships" xmlns:p="http://schemas.openxmlformats.org/presentationml/2006/main">
+  <p:cSld>
+    <p:spTree>
+      <p:nvGrpSpPr>
+        <p:cNvPr id="1" name=""/>
+        <p:cNvGrpSpPr/>
+        <p:nvPr/>
+      </p:nvGrpSpPr>
+      <p:grpSpPr>
+        <a:xfrm>
+          <a:off x="0" y="0"/>
+          <a:ext cx="0" cy="0"/>
+          <a:chOff x="0" y="0"/>
+          <a:chExt cx="0" cy="0"/>
+        </a:xfrm>
+      </p:grpSpPr>
+      <p:pic>
+        <p:nvPicPr>
+          <p:cNvPr id="3" name="圖片 2">
+            <a:extLst>
+              <a:ext uri="{FF2B5EF4-FFF2-40B4-BE49-F238E27FC236}">
+                <a16:creationId xmlns:a16="http://schemas.microsoft.com/office/drawing/2014/main" id="{4FCE4CDB-CE2A-429A-8671-72AD9E5D1C9E}"/>
+              </a:ext>
+            </a:extLst>
+          </p:cNvPr>
+          <p:cNvPicPr>
+            <a:picLocks noChangeAspect="1"/>
+          </p:cNvPicPr>
+          <p:nvPr/>
+        </p:nvPicPr>
+        <p:blipFill>
+          <a:blip r:embed="rId2">
+            <a:extLst>
+              <a:ext uri="{28A0092B-C50C-407E-A947-70E740481C1C}">
+                <a14:useLocalDpi xmlns:a14="http://schemas.microsoft.com/office/drawing/2010/main" val="0"/>
+              </a:ext>
+            </a:extLst>
+          </a:blip>
+          <a:stretch>
+            <a:fillRect/>
+          </a:stretch>
+        </p:blipFill>
+        <p:spPr>
+          <a:xfrm>
+            <a:off x="2056836" y="532996"/>
+            <a:ext cx="8078327" cy="5792008"/>
+          </a:xfrm>
+          <a:prstGeom prst="rect">
+            <a:avLst/>
+          </a:prstGeom>
+        </p:spPr>
+      </p:pic>
+      <p:sp>
+        <p:nvSpPr>
+          <p:cNvPr id="4" name="矩形 3">
+            <a:extLst>
+              <a:ext uri="{FF2B5EF4-FFF2-40B4-BE49-F238E27FC236}">
+                <a16:creationId xmlns:a16="http://schemas.microsoft.com/office/drawing/2014/main" id="{BA94E6F5-0004-45DF-A36C-B19321B7B2B4}"/>
+              </a:ext>
+            </a:extLst>
+          </p:cNvPr>
+          <p:cNvSpPr/>
+          <p:nvPr/>
+        </p:nvSpPr>
+        <p:spPr>
+          <a:xfrm>
+            <a:off x="4449448" y="2159912"/>
+            <a:ext cx="540000" cy="270000"/>
+          </a:xfrm>
+          <a:prstGeom prst="rect">
+            <a:avLst/>
+          </a:prstGeom>
+          <a:noFill/>
+          <a:ln w="38100">
+            <a:solidFill>
+              <a:srgbClr val="FF0000"/>
+            </a:solidFill>
+          </a:ln>
+        </p:spPr>
+        <p:style>
+          <a:lnRef idx="2">
+            <a:schemeClr val="accent1">
+              <a:shade val="50000"/>
+            </a:schemeClr>
+          </a:lnRef>
+          <a:fillRef idx="1">
+            <a:schemeClr val="accent1"/>
+          </a:fillRef>
+          <a:effectRef idx="0">
+            <a:schemeClr val="accent1"/>
+          </a:effectRef>
+          <a:fontRef idx="minor">
+            <a:schemeClr val="lt1"/>
+          </a:fontRef>
+        </p:style>
+        <p:txBody>
+          <a:bodyPr rtlCol="0" anchor="ctr"/>
+          <a:lstStyle/>
+          <a:p>
+            <a:pPr algn="ctr"/>
+            <a:endParaRPr lang="zh-TW" altLang="en-US"/>
+          </a:p>
+        </p:txBody>
+      </p:sp>
+    </p:spTree>
+    <p:extLst>
+      <p:ext uri="{BB962C8B-B14F-4D97-AF65-F5344CB8AC3E}">
+        <p14:creationId xmlns:p14="http://schemas.microsoft.com/office/powerpoint/2010/main" val="3893549283"/>
+      </p:ext>
+    </p:extLst>
+  </p:cSld>
+  <p:clrMapOvr>
+    <a:masterClrMapping/>
+  </p:clrMapOvr>
+</p:sld>
+</file>
+
+<file path=ppt/slides/slide14.xml><?xml version="1.0" encoding="utf-8"?>
+<p:sld xmlns:a="http://schemas.openxmlformats.org/drawingml/2006/main" xmlns:r="http://schemas.openxmlformats.org/officeDocument/2006/relationships" xmlns:p="http://schemas.openxmlformats.org/presentationml/2006/main">
+  <p:cSld>
+    <p:spTree>
+      <p:nvGrpSpPr>
+        <p:cNvPr id="1" name=""/>
+        <p:cNvGrpSpPr/>
+        <p:nvPr/>
+      </p:nvGrpSpPr>
+      <p:grpSpPr>
+        <a:xfrm>
+          <a:off x="0" y="0"/>
+          <a:ext cx="0" cy="0"/>
+          <a:chOff x="0" y="0"/>
+          <a:chExt cx="0" cy="0"/>
+        </a:xfrm>
+      </p:grpSpPr>
+      <p:pic>
+        <p:nvPicPr>
+          <p:cNvPr id="3" name="圖片 2">
+            <a:extLst>
+              <a:ext uri="{FF2B5EF4-FFF2-40B4-BE49-F238E27FC236}">
+                <a16:creationId xmlns:a16="http://schemas.microsoft.com/office/drawing/2014/main" id="{072055A1-37A2-448A-8D47-0B2EB7326054}"/>
+              </a:ext>
+            </a:extLst>
+          </p:cNvPr>
+          <p:cNvPicPr>
+            <a:picLocks noChangeAspect="1"/>
+          </p:cNvPicPr>
+          <p:nvPr/>
+        </p:nvPicPr>
+        <p:blipFill>
+          <a:blip r:embed="rId2">
+            <a:extLst>
+              <a:ext uri="{28A0092B-C50C-407E-A947-70E740481C1C}">
+                <a14:useLocalDpi xmlns:a14="http://schemas.microsoft.com/office/drawing/2010/main" val="0"/>
+              </a:ext>
+            </a:extLst>
+          </a:blip>
+          <a:stretch>
+            <a:fillRect/>
+          </a:stretch>
+        </p:blipFill>
+        <p:spPr>
+          <a:xfrm>
+            <a:off x="2056836" y="532996"/>
+            <a:ext cx="8078327" cy="5792008"/>
+          </a:xfrm>
+          <a:prstGeom prst="rect">
+            <a:avLst/>
+          </a:prstGeom>
+        </p:spPr>
+      </p:pic>
+      <p:sp>
+        <p:nvSpPr>
+          <p:cNvPr id="4" name="矩形 3">
+            <a:extLst>
+              <a:ext uri="{FF2B5EF4-FFF2-40B4-BE49-F238E27FC236}">
+                <a16:creationId xmlns:a16="http://schemas.microsoft.com/office/drawing/2014/main" id="{9C4CD742-C299-40F7-AD19-44CF85F18CAF}"/>
+              </a:ext>
+            </a:extLst>
+          </p:cNvPr>
+          <p:cNvSpPr/>
+          <p:nvPr/>
+        </p:nvSpPr>
+        <p:spPr>
+          <a:xfrm>
+            <a:off x="2056836" y="2225897"/>
+            <a:ext cx="1080000" cy="360000"/>
+          </a:xfrm>
+          <a:prstGeom prst="rect">
+            <a:avLst/>
+          </a:prstGeom>
+          <a:noFill/>
+          <a:ln w="38100">
+            <a:solidFill>
+              <a:srgbClr val="FF0000"/>
+            </a:solidFill>
+          </a:ln>
+        </p:spPr>
+        <p:style>
+          <a:lnRef idx="2">
+            <a:schemeClr val="accent1">
+              <a:shade val="50000"/>
+            </a:schemeClr>
+          </a:lnRef>
+          <a:fillRef idx="1">
+            <a:schemeClr val="accent1"/>
+          </a:fillRef>
+          <a:effectRef idx="0">
+            <a:schemeClr val="accent1"/>
+          </a:effectRef>
+          <a:fontRef idx="minor">
+            <a:schemeClr val="lt1"/>
+          </a:fontRef>
+        </p:style>
+        <p:txBody>
+          <a:bodyPr rtlCol="0" anchor="ctr"/>
+          <a:lstStyle/>
+          <a:p>
+            <a:pPr algn="ctr"/>
+            <a:endParaRPr lang="zh-TW" altLang="en-US"/>
+          </a:p>
+        </p:txBody>
+      </p:sp>
+    </p:spTree>
+    <p:extLst>
+      <p:ext uri="{BB962C8B-B14F-4D97-AF65-F5344CB8AC3E}">
+        <p14:creationId xmlns:p14="http://schemas.microsoft.com/office/powerpoint/2010/main" val="2501053289"/>
+      </p:ext>
+    </p:extLst>
+  </p:cSld>
+  <p:clrMapOvr>
+    <a:masterClrMapping/>
+  </p:clrMapOvr>
+</p:sld>
+</file>
+
+<file path=ppt/slides/slide15.xml><?xml version="1.0" encoding="utf-8"?>
+<p:sld xmlns:a="http://schemas.openxmlformats.org/drawingml/2006/main" xmlns:r="http://schemas.openxmlformats.org/officeDocument/2006/relationships" xmlns:p="http://schemas.openxmlformats.org/presentationml/2006/main">
+  <p:cSld>
+    <p:spTree>
+      <p:nvGrpSpPr>
+        <p:cNvPr id="1" name=""/>
+        <p:cNvGrpSpPr/>
+        <p:nvPr/>
+      </p:nvGrpSpPr>
+      <p:grpSpPr>
+        <a:xfrm>
+          <a:off x="0" y="0"/>
+          <a:ext cx="0" cy="0"/>
+          <a:chOff x="0" y="0"/>
+          <a:chExt cx="0" cy="0"/>
+        </a:xfrm>
+      </p:grpSpPr>
+      <p:pic>
+        <p:nvPicPr>
+          <p:cNvPr id="3" name="圖片 2">
+            <a:extLst>
+              <a:ext uri="{FF2B5EF4-FFF2-40B4-BE49-F238E27FC236}">
+                <a16:creationId xmlns:a16="http://schemas.microsoft.com/office/drawing/2014/main" id="{E507C046-700D-4918-9A77-35E8AC953159}"/>
+              </a:ext>
+            </a:extLst>
+          </p:cNvPr>
+          <p:cNvPicPr>
+            <a:picLocks noChangeAspect="1"/>
+          </p:cNvPicPr>
+          <p:nvPr/>
+        </p:nvPicPr>
+        <p:blipFill>
+          <a:blip r:embed="rId2">
+            <a:extLst>
+              <a:ext uri="{28A0092B-C50C-407E-A947-70E740481C1C}">
+                <a14:useLocalDpi xmlns:a14="http://schemas.microsoft.com/office/drawing/2010/main" val="0"/>
+              </a:ext>
+            </a:extLst>
+          </a:blip>
+          <a:stretch>
+            <a:fillRect/>
+          </a:stretch>
+        </p:blipFill>
+        <p:spPr>
+          <a:xfrm>
+            <a:off x="3814444" y="890233"/>
+            <a:ext cx="4563112" cy="5077534"/>
+          </a:xfrm>
+          <a:prstGeom prst="rect">
+            <a:avLst/>
+          </a:prstGeom>
+        </p:spPr>
+      </p:pic>
+      <p:sp>
+        <p:nvSpPr>
+          <p:cNvPr id="4" name="矩形 3">
+            <a:extLst>
+              <a:ext uri="{FF2B5EF4-FFF2-40B4-BE49-F238E27FC236}">
+                <a16:creationId xmlns:a16="http://schemas.microsoft.com/office/drawing/2014/main" id="{AA9AA1FC-BFF0-4DD9-B672-ED57F1CBD759}"/>
+              </a:ext>
+            </a:extLst>
+          </p:cNvPr>
+          <p:cNvSpPr/>
+          <p:nvPr/>
+        </p:nvSpPr>
+        <p:spPr>
+          <a:xfrm>
+            <a:off x="4903734" y="1245509"/>
+            <a:ext cx="540000" cy="270000"/>
+          </a:xfrm>
+          <a:prstGeom prst="rect">
+            <a:avLst/>
+          </a:prstGeom>
+          <a:noFill/>
+          <a:ln w="38100">
+            <a:solidFill>
+              <a:srgbClr val="FF0000"/>
+            </a:solidFill>
+          </a:ln>
+        </p:spPr>
+        <p:style>
+          <a:lnRef idx="2">
+            <a:schemeClr val="accent1">
+              <a:shade val="50000"/>
+            </a:schemeClr>
+          </a:lnRef>
+          <a:fillRef idx="1">
+            <a:schemeClr val="accent1"/>
+          </a:fillRef>
+          <a:effectRef idx="0">
+            <a:schemeClr val="accent1"/>
+          </a:effectRef>
+          <a:fontRef idx="minor">
+            <a:schemeClr val="lt1"/>
+          </a:fontRef>
+        </p:style>
+        <p:txBody>
+          <a:bodyPr rtlCol="0" anchor="ctr"/>
+          <a:lstStyle/>
+          <a:p>
+            <a:pPr algn="ctr"/>
+            <a:endParaRPr lang="zh-TW" altLang="en-US"/>
+          </a:p>
+        </p:txBody>
+      </p:sp>
+      <p:sp>
+        <p:nvSpPr>
+          <p:cNvPr id="5" name="矩形 4">
+            <a:extLst>
+              <a:ext uri="{FF2B5EF4-FFF2-40B4-BE49-F238E27FC236}">
+                <a16:creationId xmlns:a16="http://schemas.microsoft.com/office/drawing/2014/main" id="{CD41CAF2-4CBA-4060-B8F1-D4A61E85F045}"/>
+              </a:ext>
+            </a:extLst>
+          </p:cNvPr>
+          <p:cNvSpPr/>
+          <p:nvPr/>
+        </p:nvSpPr>
+        <p:spPr>
+          <a:xfrm>
+            <a:off x="6609981" y="4940817"/>
+            <a:ext cx="1530000" cy="360000"/>
+          </a:xfrm>
+          <a:prstGeom prst="rect">
+            <a:avLst/>
+          </a:prstGeom>
+          <a:noFill/>
+          <a:ln w="38100">
+            <a:solidFill>
+              <a:srgbClr val="FF0000"/>
+            </a:solidFill>
+          </a:ln>
+        </p:spPr>
+        <p:style>
+          <a:lnRef idx="2">
+            <a:schemeClr val="accent1">
+              <a:shade val="50000"/>
+            </a:schemeClr>
+          </a:lnRef>
+          <a:fillRef idx="1">
+            <a:schemeClr val="accent1"/>
+          </a:fillRef>
+          <a:effectRef idx="0">
+            <a:schemeClr val="accent1"/>
+          </a:effectRef>
+          <a:fontRef idx="minor">
+            <a:schemeClr val="lt1"/>
+          </a:fontRef>
+        </p:style>
+        <p:txBody>
+          <a:bodyPr rtlCol="0" anchor="ctr"/>
+          <a:lstStyle/>
+          <a:p>
+            <a:pPr algn="ctr"/>
+            <a:endParaRPr lang="zh-TW" altLang="en-US"/>
+          </a:p>
+        </p:txBody>
+      </p:sp>
+    </p:spTree>
+    <p:extLst>
+      <p:ext uri="{BB962C8B-B14F-4D97-AF65-F5344CB8AC3E}">
+        <p14:creationId xmlns:p14="http://schemas.microsoft.com/office/powerpoint/2010/main" val="2648966648"/>
+      </p:ext>
+    </p:extLst>
+  </p:cSld>
+  <p:clrMapOvr>
+    <a:masterClrMapping/>
+  </p:clrMapOvr>
+</p:sld>
+</file>
+
+<file path=ppt/slides/slide16.xml><?xml version="1.0" encoding="utf-8"?>
+<p:sld xmlns:a="http://schemas.openxmlformats.org/drawingml/2006/main" xmlns:r="http://schemas.openxmlformats.org/officeDocument/2006/relationships" xmlns:p="http://schemas.openxmlformats.org/presentationml/2006/main">
+  <p:cSld>
+    <p:spTree>
+      <p:nvGrpSpPr>
+        <p:cNvPr id="1" name=""/>
+        <p:cNvGrpSpPr/>
+        <p:nvPr/>
+      </p:nvGrpSpPr>
+      <p:grpSpPr>
+        <a:xfrm>
+          <a:off x="0" y="0"/>
+          <a:ext cx="0" cy="0"/>
+          <a:chOff x="0" y="0"/>
+          <a:chExt cx="0" cy="0"/>
+        </a:xfrm>
+      </p:grpSpPr>
+      <p:pic>
+        <p:nvPicPr>
+          <p:cNvPr id="3" name="圖片 2">
+            <a:extLst>
+              <a:ext uri="{FF2B5EF4-FFF2-40B4-BE49-F238E27FC236}">
+                <a16:creationId xmlns:a16="http://schemas.microsoft.com/office/drawing/2014/main" id="{DCC2D34A-2E8E-4562-95FE-094A9D2E1211}"/>
+              </a:ext>
+            </a:extLst>
+          </p:cNvPr>
+          <p:cNvPicPr>
+            <a:picLocks noChangeAspect="1"/>
+          </p:cNvPicPr>
+          <p:nvPr/>
+        </p:nvPicPr>
+        <p:blipFill>
+          <a:blip r:embed="rId2">
+            <a:extLst>
+              <a:ext uri="{28A0092B-C50C-407E-A947-70E740481C1C}">
+                <a14:useLocalDpi xmlns:a14="http://schemas.microsoft.com/office/drawing/2010/main" val="0"/>
+              </a:ext>
+            </a:extLst>
+          </a:blip>
+          <a:stretch>
+            <a:fillRect/>
+          </a:stretch>
+        </p:blipFill>
+        <p:spPr>
+          <a:xfrm>
+            <a:off x="3152364" y="642548"/>
+            <a:ext cx="5887272" cy="5572903"/>
+          </a:xfrm>
+          <a:prstGeom prst="rect">
+            <a:avLst/>
+          </a:prstGeom>
+        </p:spPr>
+      </p:pic>
+      <p:sp>
+        <p:nvSpPr>
+          <p:cNvPr id="4" name="矩形 3">
+            <a:extLst>
+              <a:ext uri="{FF2B5EF4-FFF2-40B4-BE49-F238E27FC236}">
+                <a16:creationId xmlns:a16="http://schemas.microsoft.com/office/drawing/2014/main" id="{287AB1CC-82C5-49F8-BEB7-1F531DC4E54A}"/>
+              </a:ext>
+            </a:extLst>
+          </p:cNvPr>
+          <p:cNvSpPr/>
+          <p:nvPr/>
+        </p:nvSpPr>
+        <p:spPr>
+          <a:xfrm>
+            <a:off x="4413537" y="2489847"/>
+            <a:ext cx="990000" cy="360000"/>
+          </a:xfrm>
+          <a:prstGeom prst="rect">
+            <a:avLst/>
+          </a:prstGeom>
+          <a:noFill/>
+          <a:ln w="38100">
+            <a:solidFill>
+              <a:srgbClr val="FF0000"/>
+            </a:solidFill>
+          </a:ln>
+        </p:spPr>
+        <p:style>
+          <a:lnRef idx="2">
+            <a:schemeClr val="accent1">
+              <a:shade val="50000"/>
+            </a:schemeClr>
+          </a:lnRef>
+          <a:fillRef idx="1">
+            <a:schemeClr val="accent1"/>
+          </a:fillRef>
+          <a:effectRef idx="0">
+            <a:schemeClr val="accent1"/>
+          </a:effectRef>
+          <a:fontRef idx="minor">
+            <a:schemeClr val="lt1"/>
+          </a:fontRef>
+        </p:style>
+        <p:txBody>
+          <a:bodyPr rtlCol="0" anchor="ctr"/>
+          <a:lstStyle/>
+          <a:p>
+            <a:pPr algn="ctr"/>
+            <a:endParaRPr lang="zh-TW" altLang="en-US"/>
+          </a:p>
+        </p:txBody>
+      </p:sp>
+    </p:spTree>
+    <p:extLst>
+      <p:ext uri="{BB962C8B-B14F-4D97-AF65-F5344CB8AC3E}">
+        <p14:creationId xmlns:p14="http://schemas.microsoft.com/office/powerpoint/2010/main" val="3221797287"/>
+      </p:ext>
+    </p:extLst>
+  </p:cSld>
+  <p:clrMapOvr>
+    <a:masterClrMapping/>
+  </p:clrMapOvr>
+</p:sld>
+</file>
+
+<file path=ppt/slides/slide17.xml><?xml version="1.0" encoding="utf-8"?>
+<p:sld xmlns:a="http://schemas.openxmlformats.org/drawingml/2006/main" xmlns:r="http://schemas.openxmlformats.org/officeDocument/2006/relationships" xmlns:p="http://schemas.openxmlformats.org/presentationml/2006/main">
+  <p:cSld>
+    <p:spTree>
+      <p:nvGrpSpPr>
+        <p:cNvPr id="1" name=""/>
+        <p:cNvGrpSpPr/>
+        <p:nvPr/>
+      </p:nvGrpSpPr>
+      <p:grpSpPr>
+        <a:xfrm>
+          <a:off x="0" y="0"/>
+          <a:ext cx="0" cy="0"/>
+          <a:chOff x="0" y="0"/>
+          <a:chExt cx="0" cy="0"/>
+        </a:xfrm>
+      </p:grpSpPr>
+      <p:pic>
+        <p:nvPicPr>
+          <p:cNvPr id="3" name="圖片 2">
+            <a:extLst>
+              <a:ext uri="{FF2B5EF4-FFF2-40B4-BE49-F238E27FC236}">
+                <a16:creationId xmlns:a16="http://schemas.microsoft.com/office/drawing/2014/main" id="{2D888D27-5141-476F-9EC2-7A47DBE5FCA6}"/>
+              </a:ext>
+            </a:extLst>
+          </p:cNvPr>
+          <p:cNvPicPr>
+            <a:picLocks noChangeAspect="1"/>
+          </p:cNvPicPr>
+          <p:nvPr/>
+        </p:nvPicPr>
+        <p:blipFill>
+          <a:blip r:embed="rId2">
+            <a:extLst>
+              <a:ext uri="{28A0092B-C50C-407E-A947-70E740481C1C}">
+                <a14:useLocalDpi xmlns:a14="http://schemas.microsoft.com/office/drawing/2010/main" val="0"/>
+              </a:ext>
+            </a:extLst>
+          </a:blip>
+          <a:stretch>
+            <a:fillRect/>
+          </a:stretch>
+        </p:blipFill>
+        <p:spPr>
+          <a:xfrm>
+            <a:off x="2985653" y="2643078"/>
+            <a:ext cx="6220693" cy="1571844"/>
+          </a:xfrm>
+          <a:prstGeom prst="rect">
+            <a:avLst/>
+          </a:prstGeom>
+        </p:spPr>
+      </p:pic>
+      <p:sp>
+        <p:nvSpPr>
+          <p:cNvPr id="4" name="矩形 3">
+            <a:extLst>
+              <a:ext uri="{FF2B5EF4-FFF2-40B4-BE49-F238E27FC236}">
+                <a16:creationId xmlns:a16="http://schemas.microsoft.com/office/drawing/2014/main" id="{83D1DD38-ABA2-4CD1-ABDF-102F312D5C77}"/>
+              </a:ext>
+            </a:extLst>
+          </p:cNvPr>
+          <p:cNvSpPr/>
+          <p:nvPr/>
+        </p:nvSpPr>
+        <p:spPr>
+          <a:xfrm>
+            <a:off x="4215575" y="3134989"/>
+            <a:ext cx="2160000" cy="270000"/>
+          </a:xfrm>
+          <a:prstGeom prst="rect">
+            <a:avLst/>
+          </a:prstGeom>
+          <a:noFill/>
+          <a:ln w="38100">
+            <a:solidFill>
+              <a:srgbClr val="FF0000"/>
+            </a:solidFill>
+          </a:ln>
+        </p:spPr>
+        <p:style>
+          <a:lnRef idx="2">
+            <a:schemeClr val="accent1">
+              <a:shade val="50000"/>
+            </a:schemeClr>
+          </a:lnRef>
+          <a:fillRef idx="1">
+            <a:schemeClr val="accent1"/>
+          </a:fillRef>
+          <a:effectRef idx="0">
+            <a:schemeClr val="accent1"/>
+          </a:effectRef>
+          <a:fontRef idx="minor">
+            <a:schemeClr val="lt1"/>
+          </a:fontRef>
+        </p:style>
+        <p:txBody>
+          <a:bodyPr rtlCol="0" anchor="ctr"/>
+          <a:lstStyle/>
+          <a:p>
+            <a:pPr algn="ctr"/>
+            <a:endParaRPr lang="zh-TW" altLang="en-US"/>
+          </a:p>
+        </p:txBody>
+      </p:sp>
+      <p:sp>
+        <p:nvSpPr>
+          <p:cNvPr id="5" name="矩形 4">
+            <a:extLst>
+              <a:ext uri="{FF2B5EF4-FFF2-40B4-BE49-F238E27FC236}">
+                <a16:creationId xmlns:a16="http://schemas.microsoft.com/office/drawing/2014/main" id="{8292C77B-3290-432A-B597-4827A4EC4FC6}"/>
+              </a:ext>
+            </a:extLst>
+          </p:cNvPr>
+          <p:cNvSpPr/>
+          <p:nvPr/>
+        </p:nvSpPr>
+        <p:spPr>
+          <a:xfrm>
+            <a:off x="4215575" y="3447854"/>
+            <a:ext cx="2160000" cy="270000"/>
+          </a:xfrm>
+          <a:prstGeom prst="rect">
+            <a:avLst/>
+          </a:prstGeom>
+          <a:noFill/>
+          <a:ln w="38100">
+            <a:solidFill>
+              <a:srgbClr val="FF0000"/>
+            </a:solidFill>
+          </a:ln>
+        </p:spPr>
+        <p:style>
+          <a:lnRef idx="2">
+            <a:schemeClr val="accent1">
+              <a:shade val="50000"/>
+            </a:schemeClr>
+          </a:lnRef>
+          <a:fillRef idx="1">
+            <a:schemeClr val="accent1"/>
+          </a:fillRef>
+          <a:effectRef idx="0">
+            <a:schemeClr val="accent1"/>
+          </a:effectRef>
+          <a:fontRef idx="minor">
+            <a:schemeClr val="lt1"/>
+          </a:fontRef>
+        </p:style>
+        <p:txBody>
+          <a:bodyPr rtlCol="0" anchor="ctr"/>
+          <a:lstStyle/>
+          <a:p>
+            <a:pPr algn="ctr"/>
+            <a:endParaRPr lang="zh-TW" altLang="en-US"/>
+          </a:p>
+        </p:txBody>
+      </p:sp>
+      <p:sp>
+        <p:nvSpPr>
+          <p:cNvPr id="6" name="矩形 5">
+            <a:extLst>
+              <a:ext uri="{FF2B5EF4-FFF2-40B4-BE49-F238E27FC236}">
+                <a16:creationId xmlns:a16="http://schemas.microsoft.com/office/drawing/2014/main" id="{103C6370-51AF-4DD5-B02B-67C67E2B4F34}"/>
+              </a:ext>
+            </a:extLst>
+          </p:cNvPr>
+          <p:cNvSpPr/>
+          <p:nvPr/>
+        </p:nvSpPr>
+        <p:spPr>
+          <a:xfrm>
+            <a:off x="7316994" y="3779573"/>
+            <a:ext cx="900000" cy="360000"/>
+          </a:xfrm>
+          <a:prstGeom prst="rect">
+            <a:avLst/>
+          </a:prstGeom>
+          <a:noFill/>
+          <a:ln w="38100">
+            <a:solidFill>
+              <a:srgbClr val="FF0000"/>
+            </a:solidFill>
+          </a:ln>
+        </p:spPr>
+        <p:style>
+          <a:lnRef idx="2">
+            <a:schemeClr val="accent1">
+              <a:shade val="50000"/>
+            </a:schemeClr>
+          </a:lnRef>
+          <a:fillRef idx="1">
+            <a:schemeClr val="accent1"/>
+          </a:fillRef>
+          <a:effectRef idx="0">
+            <a:schemeClr val="accent1"/>
+          </a:effectRef>
+          <a:fontRef idx="minor">
+            <a:schemeClr val="lt1"/>
+          </a:fontRef>
+        </p:style>
+        <p:txBody>
+          <a:bodyPr rtlCol="0" anchor="ctr"/>
+          <a:lstStyle/>
+          <a:p>
+            <a:pPr algn="ctr"/>
+            <a:endParaRPr lang="zh-TW" altLang="en-US"/>
+          </a:p>
+        </p:txBody>
+      </p:sp>
+    </p:spTree>
+    <p:extLst>
+      <p:ext uri="{BB962C8B-B14F-4D97-AF65-F5344CB8AC3E}">
+        <p14:creationId xmlns:p14="http://schemas.microsoft.com/office/powerpoint/2010/main" val="2328686878"/>
+      </p:ext>
+    </p:extLst>
+  </p:cSld>
+  <p:clrMapOvr>
+    <a:masterClrMapping/>
+  </p:clrMapOvr>
+</p:sld>
+</file>
+
+<file path=ppt/slides/slide18.xml><?xml version="1.0" encoding="utf-8"?>
+<p:sld xmlns:a="http://schemas.openxmlformats.org/drawingml/2006/main" xmlns:r="http://schemas.openxmlformats.org/officeDocument/2006/relationships" xmlns:p="http://schemas.openxmlformats.org/presentationml/2006/main">
+  <p:cSld>
+    <p:spTree>
+      <p:nvGrpSpPr>
+        <p:cNvPr id="1" name=""/>
+        <p:cNvGrpSpPr/>
+        <p:nvPr/>
+      </p:nvGrpSpPr>
+      <p:grpSpPr>
+        <a:xfrm>
+          <a:off x="0" y="0"/>
+          <a:ext cx="0" cy="0"/>
+          <a:chOff x="0" y="0"/>
+          <a:chExt cx="0" cy="0"/>
+        </a:xfrm>
+      </p:grpSpPr>
+      <p:pic>
+        <p:nvPicPr>
+          <p:cNvPr id="3" name="圖片 2">
+            <a:extLst>
+              <a:ext uri="{FF2B5EF4-FFF2-40B4-BE49-F238E27FC236}">
+                <a16:creationId xmlns:a16="http://schemas.microsoft.com/office/drawing/2014/main" id="{CAED483B-2AF9-4416-A0E9-347223B0CF95}"/>
+              </a:ext>
+            </a:extLst>
+          </p:cNvPr>
+          <p:cNvPicPr>
+            <a:picLocks noChangeAspect="1"/>
+          </p:cNvPicPr>
+          <p:nvPr/>
+        </p:nvPicPr>
+        <p:blipFill>
+          <a:blip r:embed="rId2">
+            <a:extLst>
+              <a:ext uri="{28A0092B-C50C-407E-A947-70E740481C1C}">
+                <a14:useLocalDpi xmlns:a14="http://schemas.microsoft.com/office/drawing/2010/main" val="0"/>
+              </a:ext>
+            </a:extLst>
+          </a:blip>
+          <a:stretch>
+            <a:fillRect/>
+          </a:stretch>
+        </p:blipFill>
+        <p:spPr>
+          <a:xfrm>
+            <a:off x="3152364" y="642548"/>
+            <a:ext cx="5887272" cy="5572903"/>
+          </a:xfrm>
+          <a:prstGeom prst="rect">
+            <a:avLst/>
+          </a:prstGeom>
+        </p:spPr>
+      </p:pic>
+      <p:sp>
+        <p:nvSpPr>
+          <p:cNvPr id="4" name="矩形 3">
+            <a:extLst>
+              <a:ext uri="{FF2B5EF4-FFF2-40B4-BE49-F238E27FC236}">
+                <a16:creationId xmlns:a16="http://schemas.microsoft.com/office/drawing/2014/main" id="{4EA141B9-9892-4416-9AAB-EFAA72AB9DE7}"/>
+              </a:ext>
+            </a:extLst>
+          </p:cNvPr>
+          <p:cNvSpPr/>
+          <p:nvPr/>
+        </p:nvSpPr>
+        <p:spPr>
+          <a:xfrm>
+            <a:off x="5441061" y="4884256"/>
+            <a:ext cx="990000" cy="360000"/>
+          </a:xfrm>
+          <a:prstGeom prst="rect">
+            <a:avLst/>
+          </a:prstGeom>
+          <a:noFill/>
+          <a:ln w="38100">
+            <a:solidFill>
+              <a:srgbClr val="FF0000"/>
+            </a:solidFill>
+          </a:ln>
+        </p:spPr>
+        <p:style>
+          <a:lnRef idx="2">
+            <a:schemeClr val="accent1">
+              <a:shade val="50000"/>
+            </a:schemeClr>
+          </a:lnRef>
+          <a:fillRef idx="1">
+            <a:schemeClr val="accent1"/>
+          </a:fillRef>
+          <a:effectRef idx="0">
+            <a:schemeClr val="accent1"/>
+          </a:effectRef>
+          <a:fontRef idx="minor">
+            <a:schemeClr val="lt1"/>
+          </a:fontRef>
+        </p:style>
+        <p:txBody>
+          <a:bodyPr rtlCol="0" anchor="ctr"/>
+          <a:lstStyle/>
+          <a:p>
+            <a:pPr algn="ctr"/>
+            <a:endParaRPr lang="zh-TW" altLang="en-US"/>
+          </a:p>
+        </p:txBody>
+      </p:sp>
+    </p:spTree>
+    <p:extLst>
+      <p:ext uri="{BB962C8B-B14F-4D97-AF65-F5344CB8AC3E}">
+        <p14:creationId xmlns:p14="http://schemas.microsoft.com/office/powerpoint/2010/main" val="3106558258"/>
+      </p:ext>
+    </p:extLst>
+  </p:cSld>
+  <p:clrMapOvr>
+    <a:masterClrMapping/>
+  </p:clrMapOvr>
+</p:sld>
+</file>
+
+<file path=ppt/slides/slide19.xml><?xml version="1.0" encoding="utf-8"?>
+<p:sld xmlns:a="http://schemas.openxmlformats.org/drawingml/2006/main" xmlns:r="http://schemas.openxmlformats.org/officeDocument/2006/relationships" xmlns:p="http://schemas.openxmlformats.org/presentationml/2006/main">
+  <p:cSld>
+    <p:spTree>
+      <p:nvGrpSpPr>
+        <p:cNvPr id="1" name=""/>
+        <p:cNvGrpSpPr/>
+        <p:nvPr/>
+      </p:nvGrpSpPr>
+      <p:grpSpPr>
+        <a:xfrm>
+          <a:off x="0" y="0"/>
+          <a:ext cx="0" cy="0"/>
+          <a:chOff x="0" y="0"/>
+          <a:chExt cx="0" cy="0"/>
+        </a:xfrm>
+      </p:grpSpPr>
+      <p:pic>
+        <p:nvPicPr>
           <p:cNvPr id="4" name="圖片 3"/>
           <p:cNvPicPr>
             <a:picLocks noChangeAspect="1"/>
@@ -3080,7 +4573,13 @@
       </p:grpSpPr>
       <p:pic>
         <p:nvPicPr>
-          <p:cNvPr id="2" name="圖片 1"/>
+          <p:cNvPr id="5" name="圖片 4">
+            <a:extLst>
+              <a:ext uri="{FF2B5EF4-FFF2-40B4-BE49-F238E27FC236}">
+                <a16:creationId xmlns:a16="http://schemas.microsoft.com/office/drawing/2014/main" id="{8969822D-B58A-4BE1-801D-1A8E0738FDAB}"/>
+              </a:ext>
+            </a:extLst>
+          </p:cNvPr>
           <p:cNvPicPr>
             <a:picLocks noChangeAspect="1"/>
           </p:cNvPicPr>
@@ -3100,8 +4599,8 @@
         </p:blipFill>
         <p:spPr>
           <a:xfrm>
-            <a:off x="354418" y="0"/>
-            <a:ext cx="11483163" cy="6858000"/>
+            <a:off x="3376233" y="899759"/>
+            <a:ext cx="5439534" cy="5058481"/>
           </a:xfrm>
           <a:prstGeom prst="rect">
             <a:avLst/>
@@ -3110,14 +4609,20 @@
       </p:pic>
       <p:sp>
         <p:nvSpPr>
-          <p:cNvPr id="3" name="矩形 2"/>
+          <p:cNvPr id="6" name="矩形 5">
+            <a:extLst>
+              <a:ext uri="{FF2B5EF4-FFF2-40B4-BE49-F238E27FC236}">
+                <a16:creationId xmlns:a16="http://schemas.microsoft.com/office/drawing/2014/main" id="{36C2183D-3751-4500-9409-B6A4FCA7D71D}"/>
+              </a:ext>
+            </a:extLst>
+          </p:cNvPr>
           <p:cNvSpPr/>
           <p:nvPr/>
         </p:nvSpPr>
         <p:spPr>
           <a:xfrm>
-            <a:off x="8595362" y="2969109"/>
-            <a:ext cx="2250000" cy="450000"/>
+            <a:off x="5118750" y="1828796"/>
+            <a:ext cx="2430000" cy="2610000"/>
           </a:xfrm>
           <a:prstGeom prst="rect">
             <a:avLst/>
@@ -3157,7 +4662,765 @@
     </p:spTree>
     <p:extLst>
       <p:ext uri="{BB962C8B-B14F-4D97-AF65-F5344CB8AC3E}">
+        <p14:creationId xmlns:p14="http://schemas.microsoft.com/office/powerpoint/2010/main" val="4014660789"/>
+      </p:ext>
+    </p:extLst>
+  </p:cSld>
+  <p:clrMapOvr>
+    <a:masterClrMapping/>
+  </p:clrMapOvr>
+</p:sld>
+</file>
+
+<file path=ppt/slides/slide20.xml><?xml version="1.0" encoding="utf-8"?>
+<p:sld xmlns:a="http://schemas.openxmlformats.org/drawingml/2006/main" xmlns:r="http://schemas.openxmlformats.org/officeDocument/2006/relationships" xmlns:p="http://schemas.openxmlformats.org/presentationml/2006/main">
+  <p:cSld>
+    <p:spTree>
+      <p:nvGrpSpPr>
+        <p:cNvPr id="1" name=""/>
+        <p:cNvGrpSpPr/>
+        <p:nvPr/>
+      </p:nvGrpSpPr>
+      <p:grpSpPr>
+        <a:xfrm>
+          <a:off x="0" y="0"/>
+          <a:ext cx="0" cy="0"/>
+          <a:chOff x="0" y="0"/>
+          <a:chExt cx="0" cy="0"/>
+        </a:xfrm>
+      </p:grpSpPr>
+      <p:pic>
+        <p:nvPicPr>
+          <p:cNvPr id="2" name="圖片 1"/>
+          <p:cNvPicPr>
+            <a:picLocks noChangeAspect="1"/>
+          </p:cNvPicPr>
+          <p:nvPr/>
+        </p:nvPicPr>
+        <p:blipFill>
+          <a:blip r:embed="rId2">
+            <a:extLst>
+              <a:ext uri="{28A0092B-C50C-407E-A947-70E740481C1C}">
+                <a14:useLocalDpi xmlns:a14="http://schemas.microsoft.com/office/drawing/2010/main" val="0"/>
+              </a:ext>
+            </a:extLst>
+          </a:blip>
+          <a:stretch>
+            <a:fillRect/>
+          </a:stretch>
+        </p:blipFill>
+        <p:spPr>
+          <a:xfrm>
+            <a:off x="354418" y="0"/>
+            <a:ext cx="11483163" cy="6858000"/>
+          </a:xfrm>
+          <a:prstGeom prst="rect">
+            <a:avLst/>
+          </a:prstGeom>
+        </p:spPr>
+      </p:pic>
+      <p:sp>
+        <p:nvSpPr>
+          <p:cNvPr id="3" name="矩形 2"/>
+          <p:cNvSpPr/>
+          <p:nvPr/>
+        </p:nvSpPr>
+        <p:spPr>
+          <a:xfrm>
+            <a:off x="8595362" y="2969109"/>
+            <a:ext cx="2250000" cy="450000"/>
+          </a:xfrm>
+          <a:prstGeom prst="rect">
+            <a:avLst/>
+          </a:prstGeom>
+          <a:noFill/>
+          <a:ln w="38100">
+            <a:solidFill>
+              <a:srgbClr val="FF0000"/>
+            </a:solidFill>
+          </a:ln>
+        </p:spPr>
+        <p:style>
+          <a:lnRef idx="2">
+            <a:schemeClr val="accent1">
+              <a:shade val="50000"/>
+            </a:schemeClr>
+          </a:lnRef>
+          <a:fillRef idx="1">
+            <a:schemeClr val="accent1"/>
+          </a:fillRef>
+          <a:effectRef idx="0">
+            <a:schemeClr val="accent1"/>
+          </a:effectRef>
+          <a:fontRef idx="minor">
+            <a:schemeClr val="lt1"/>
+          </a:fontRef>
+        </p:style>
+        <p:txBody>
+          <a:bodyPr rtlCol="0" anchor="ctr"/>
+          <a:lstStyle/>
+          <a:p>
+            <a:pPr algn="ctr"/>
+            <a:endParaRPr lang="zh-TW" altLang="en-US"/>
+          </a:p>
+        </p:txBody>
+      </p:sp>
+    </p:spTree>
+    <p:extLst>
+      <p:ext uri="{BB962C8B-B14F-4D97-AF65-F5344CB8AC3E}">
         <p14:creationId xmlns:p14="http://schemas.microsoft.com/office/powerpoint/2010/main" val="20280838"/>
+      </p:ext>
+    </p:extLst>
+  </p:cSld>
+  <p:clrMapOvr>
+    <a:masterClrMapping/>
+  </p:clrMapOvr>
+</p:sld>
+</file>
+
+<file path=ppt/slides/slide21.xml><?xml version="1.0" encoding="utf-8"?>
+<p:sld xmlns:a="http://schemas.openxmlformats.org/drawingml/2006/main" xmlns:r="http://schemas.openxmlformats.org/officeDocument/2006/relationships" xmlns:p="http://schemas.openxmlformats.org/presentationml/2006/main">
+  <p:cSld>
+    <p:spTree>
+      <p:nvGrpSpPr>
+        <p:cNvPr id="1" name=""/>
+        <p:cNvGrpSpPr/>
+        <p:nvPr/>
+      </p:nvGrpSpPr>
+      <p:grpSpPr>
+        <a:xfrm>
+          <a:off x="0" y="0"/>
+          <a:ext cx="0" cy="0"/>
+          <a:chOff x="0" y="0"/>
+          <a:chExt cx="0" cy="0"/>
+        </a:xfrm>
+      </p:grpSpPr>
+      <p:pic>
+        <p:nvPicPr>
+          <p:cNvPr id="4" name="圖片 3"/>
+          <p:cNvPicPr>
+            <a:picLocks noChangeAspect="1"/>
+          </p:cNvPicPr>
+          <p:nvPr/>
+        </p:nvPicPr>
+        <p:blipFill>
+          <a:blip r:embed="rId2">
+            <a:extLst>
+              <a:ext uri="{28A0092B-C50C-407E-A947-70E740481C1C}">
+                <a14:useLocalDpi xmlns:a14="http://schemas.microsoft.com/office/drawing/2010/main" val="0"/>
+              </a:ext>
+            </a:extLst>
+          </a:blip>
+          <a:stretch>
+            <a:fillRect/>
+          </a:stretch>
+        </p:blipFill>
+        <p:spPr>
+          <a:xfrm>
+            <a:off x="354418" y="0"/>
+            <a:ext cx="11483163" cy="6858000"/>
+          </a:xfrm>
+          <a:prstGeom prst="rect">
+            <a:avLst/>
+          </a:prstGeom>
+        </p:spPr>
+      </p:pic>
+      <p:sp>
+        <p:nvSpPr>
+          <p:cNvPr id="3" name="矩形 2"/>
+          <p:cNvSpPr/>
+          <p:nvPr/>
+        </p:nvSpPr>
+        <p:spPr>
+          <a:xfrm>
+            <a:off x="4518209" y="4883970"/>
+            <a:ext cx="4950000" cy="360000"/>
+          </a:xfrm>
+          <a:prstGeom prst="rect">
+            <a:avLst/>
+          </a:prstGeom>
+          <a:noFill/>
+          <a:ln w="38100">
+            <a:solidFill>
+              <a:srgbClr val="FF0000"/>
+            </a:solidFill>
+          </a:ln>
+        </p:spPr>
+        <p:style>
+          <a:lnRef idx="2">
+            <a:schemeClr val="accent1">
+              <a:shade val="50000"/>
+            </a:schemeClr>
+          </a:lnRef>
+          <a:fillRef idx="1">
+            <a:schemeClr val="accent1"/>
+          </a:fillRef>
+          <a:effectRef idx="0">
+            <a:schemeClr val="accent1"/>
+          </a:effectRef>
+          <a:fontRef idx="minor">
+            <a:schemeClr val="lt1"/>
+          </a:fontRef>
+        </p:style>
+        <p:txBody>
+          <a:bodyPr rtlCol="0" anchor="ctr"/>
+          <a:lstStyle/>
+          <a:p>
+            <a:pPr algn="ctr"/>
+            <a:endParaRPr lang="zh-TW" altLang="en-US"/>
+          </a:p>
+        </p:txBody>
+      </p:sp>
+    </p:spTree>
+    <p:extLst>
+      <p:ext uri="{BB962C8B-B14F-4D97-AF65-F5344CB8AC3E}">
+        <p14:creationId xmlns:p14="http://schemas.microsoft.com/office/powerpoint/2010/main" val="1030518843"/>
+      </p:ext>
+    </p:extLst>
+  </p:cSld>
+  <p:clrMapOvr>
+    <a:masterClrMapping/>
+  </p:clrMapOvr>
+</p:sld>
+</file>
+
+<file path=ppt/slides/slide22.xml><?xml version="1.0" encoding="utf-8"?>
+<p:sld xmlns:a="http://schemas.openxmlformats.org/drawingml/2006/main" xmlns:r="http://schemas.openxmlformats.org/officeDocument/2006/relationships" xmlns:p="http://schemas.openxmlformats.org/presentationml/2006/main">
+  <p:cSld>
+    <p:spTree>
+      <p:nvGrpSpPr>
+        <p:cNvPr id="1" name=""/>
+        <p:cNvGrpSpPr/>
+        <p:nvPr/>
+      </p:nvGrpSpPr>
+      <p:grpSpPr>
+        <a:xfrm>
+          <a:off x="0" y="0"/>
+          <a:ext cx="0" cy="0"/>
+          <a:chOff x="0" y="0"/>
+          <a:chExt cx="0" cy="0"/>
+        </a:xfrm>
+      </p:grpSpPr>
+      <p:pic>
+        <p:nvPicPr>
+          <p:cNvPr id="3" name="圖片 2"/>
+          <p:cNvPicPr>
+            <a:picLocks noChangeAspect="1"/>
+          </p:cNvPicPr>
+          <p:nvPr/>
+        </p:nvPicPr>
+        <p:blipFill>
+          <a:blip r:embed="rId2">
+            <a:extLst>
+              <a:ext uri="{28A0092B-C50C-407E-A947-70E740481C1C}">
+                <a14:useLocalDpi xmlns:a14="http://schemas.microsoft.com/office/drawing/2010/main" val="0"/>
+              </a:ext>
+            </a:extLst>
+          </a:blip>
+          <a:stretch>
+            <a:fillRect/>
+          </a:stretch>
+        </p:blipFill>
+        <p:spPr>
+          <a:xfrm>
+            <a:off x="354418" y="0"/>
+            <a:ext cx="11483163" cy="6858000"/>
+          </a:xfrm>
+          <a:prstGeom prst="rect">
+            <a:avLst/>
+          </a:prstGeom>
+        </p:spPr>
+      </p:pic>
+      <p:sp>
+        <p:nvSpPr>
+          <p:cNvPr id="4" name="矩形 3"/>
+          <p:cNvSpPr/>
+          <p:nvPr/>
+        </p:nvSpPr>
+        <p:spPr>
+          <a:xfrm>
+            <a:off x="8595362" y="2969109"/>
+            <a:ext cx="2250000" cy="450000"/>
+          </a:xfrm>
+          <a:prstGeom prst="rect">
+            <a:avLst/>
+          </a:prstGeom>
+          <a:noFill/>
+          <a:ln w="38100">
+            <a:solidFill>
+              <a:srgbClr val="FF0000"/>
+            </a:solidFill>
+          </a:ln>
+        </p:spPr>
+        <p:style>
+          <a:lnRef idx="2">
+            <a:schemeClr val="accent1">
+              <a:shade val="50000"/>
+            </a:schemeClr>
+          </a:lnRef>
+          <a:fillRef idx="1">
+            <a:schemeClr val="accent1"/>
+          </a:fillRef>
+          <a:effectRef idx="0">
+            <a:schemeClr val="accent1"/>
+          </a:effectRef>
+          <a:fontRef idx="minor">
+            <a:schemeClr val="lt1"/>
+          </a:fontRef>
+        </p:style>
+        <p:txBody>
+          <a:bodyPr rtlCol="0" anchor="ctr"/>
+          <a:lstStyle/>
+          <a:p>
+            <a:pPr algn="ctr"/>
+            <a:endParaRPr lang="zh-TW" altLang="en-US"/>
+          </a:p>
+        </p:txBody>
+      </p:sp>
+    </p:spTree>
+    <p:extLst>
+      <p:ext uri="{BB962C8B-B14F-4D97-AF65-F5344CB8AC3E}">
+        <p14:creationId xmlns:p14="http://schemas.microsoft.com/office/powerpoint/2010/main" val="3279501541"/>
+      </p:ext>
+    </p:extLst>
+  </p:cSld>
+  <p:clrMapOvr>
+    <a:masterClrMapping/>
+  </p:clrMapOvr>
+</p:sld>
+</file>
+
+<file path=ppt/slides/slide23.xml><?xml version="1.0" encoding="utf-8"?>
+<p:sld xmlns:a="http://schemas.openxmlformats.org/drawingml/2006/main" xmlns:r="http://schemas.openxmlformats.org/officeDocument/2006/relationships" xmlns:p="http://schemas.openxmlformats.org/presentationml/2006/main">
+  <p:cSld>
+    <p:spTree>
+      <p:nvGrpSpPr>
+        <p:cNvPr id="1" name=""/>
+        <p:cNvGrpSpPr/>
+        <p:nvPr/>
+      </p:nvGrpSpPr>
+      <p:grpSpPr>
+        <a:xfrm>
+          <a:off x="0" y="0"/>
+          <a:ext cx="0" cy="0"/>
+          <a:chOff x="0" y="0"/>
+          <a:chExt cx="0" cy="0"/>
+        </a:xfrm>
+      </p:grpSpPr>
+      <p:pic>
+        <p:nvPicPr>
+          <p:cNvPr id="3" name="圖片 2">
+            <a:extLst>
+              <a:ext uri="{FF2B5EF4-FFF2-40B4-BE49-F238E27FC236}">
+                <a16:creationId xmlns:a16="http://schemas.microsoft.com/office/drawing/2014/main" id="{72C6D370-CB4F-42DE-9556-1CCED7D5D573}"/>
+              </a:ext>
+            </a:extLst>
+          </p:cNvPr>
+          <p:cNvPicPr>
+            <a:picLocks noChangeAspect="1"/>
+          </p:cNvPicPr>
+          <p:nvPr/>
+        </p:nvPicPr>
+        <p:blipFill>
+          <a:blip r:embed="rId2">
+            <a:extLst>
+              <a:ext uri="{28A0092B-C50C-407E-A947-70E740481C1C}">
+                <a14:useLocalDpi xmlns:a14="http://schemas.microsoft.com/office/drawing/2010/main" val="0"/>
+              </a:ext>
+            </a:extLst>
+          </a:blip>
+          <a:stretch>
+            <a:fillRect/>
+          </a:stretch>
+        </p:blipFill>
+        <p:spPr>
+          <a:xfrm>
+            <a:off x="2446020" y="0"/>
+            <a:ext cx="7299960" cy="6858000"/>
+          </a:xfrm>
+          <a:prstGeom prst="rect">
+            <a:avLst/>
+          </a:prstGeom>
+        </p:spPr>
+      </p:pic>
+      <p:cxnSp>
+        <p:nvCxnSpPr>
+          <p:cNvPr id="5" name="直線接點 4">
+            <a:extLst>
+              <a:ext uri="{FF2B5EF4-FFF2-40B4-BE49-F238E27FC236}">
+                <a16:creationId xmlns:a16="http://schemas.microsoft.com/office/drawing/2014/main" id="{E27D5576-9BD3-48F5-A2B9-53C06C8E3C5A}"/>
+              </a:ext>
+            </a:extLst>
+          </p:cNvPr>
+          <p:cNvCxnSpPr>
+            <a:cxnSpLocks/>
+          </p:cNvCxnSpPr>
+          <p:nvPr/>
+        </p:nvCxnSpPr>
+        <p:spPr>
+          <a:xfrm>
+            <a:off x="7354625" y="2142067"/>
+            <a:ext cx="0" cy="3086930"/>
+          </a:xfrm>
+          <a:prstGeom prst="line">
+            <a:avLst/>
+          </a:prstGeom>
+          <a:ln w="38100">
+            <a:solidFill>
+              <a:srgbClr val="7030A0"/>
+            </a:solidFill>
+            <a:prstDash val="dashDot"/>
+          </a:ln>
+        </p:spPr>
+        <p:style>
+          <a:lnRef idx="1">
+            <a:schemeClr val="accent1"/>
+          </a:lnRef>
+          <a:fillRef idx="0">
+            <a:schemeClr val="accent1"/>
+          </a:fillRef>
+          <a:effectRef idx="0">
+            <a:schemeClr val="accent1"/>
+          </a:effectRef>
+          <a:fontRef idx="minor">
+            <a:schemeClr val="tx1"/>
+          </a:fontRef>
+        </p:style>
+      </p:cxnSp>
+    </p:spTree>
+    <p:extLst>
+      <p:ext uri="{BB962C8B-B14F-4D97-AF65-F5344CB8AC3E}">
+        <p14:creationId xmlns:p14="http://schemas.microsoft.com/office/powerpoint/2010/main" val="1474439682"/>
+      </p:ext>
+    </p:extLst>
+  </p:cSld>
+  <p:clrMapOvr>
+    <a:masterClrMapping/>
+  </p:clrMapOvr>
+</p:sld>
+</file>
+
+<file path=ppt/slides/slide24.xml><?xml version="1.0" encoding="utf-8"?>
+<p:sld xmlns:a="http://schemas.openxmlformats.org/drawingml/2006/main" xmlns:r="http://schemas.openxmlformats.org/officeDocument/2006/relationships" xmlns:p="http://schemas.openxmlformats.org/presentationml/2006/main">
+  <p:cSld>
+    <p:spTree>
+      <p:nvGrpSpPr>
+        <p:cNvPr id="1" name=""/>
+        <p:cNvGrpSpPr/>
+        <p:nvPr/>
+      </p:nvGrpSpPr>
+      <p:grpSpPr>
+        <a:xfrm>
+          <a:off x="0" y="0"/>
+          <a:ext cx="0" cy="0"/>
+          <a:chOff x="0" y="0"/>
+          <a:chExt cx="0" cy="0"/>
+        </a:xfrm>
+      </p:grpSpPr>
+      <p:pic>
+        <p:nvPicPr>
+          <p:cNvPr id="3" name="圖片 2">
+            <a:extLst>
+              <a:ext uri="{FF2B5EF4-FFF2-40B4-BE49-F238E27FC236}">
+                <a16:creationId xmlns:a16="http://schemas.microsoft.com/office/drawing/2014/main" id="{50CA9CA8-FF12-4847-A906-2AB2FEAC6E5D}"/>
+              </a:ext>
+            </a:extLst>
+          </p:cNvPr>
+          <p:cNvPicPr>
+            <a:picLocks noChangeAspect="1"/>
+          </p:cNvPicPr>
+          <p:nvPr/>
+        </p:nvPicPr>
+        <p:blipFill>
+          <a:blip r:embed="rId2">
+            <a:extLst>
+              <a:ext uri="{28A0092B-C50C-407E-A947-70E740481C1C}">
+                <a14:useLocalDpi xmlns:a14="http://schemas.microsoft.com/office/drawing/2010/main" val="0"/>
+              </a:ext>
+            </a:extLst>
+          </a:blip>
+          <a:stretch>
+            <a:fillRect/>
+          </a:stretch>
+        </p:blipFill>
+        <p:spPr>
+          <a:xfrm>
+            <a:off x="2446020" y="0"/>
+            <a:ext cx="7299960" cy="6858000"/>
+          </a:xfrm>
+          <a:prstGeom prst="rect">
+            <a:avLst/>
+          </a:prstGeom>
+        </p:spPr>
+      </p:pic>
+      <p:cxnSp>
+        <p:nvCxnSpPr>
+          <p:cNvPr id="4" name="直線接點 3">
+            <a:extLst>
+              <a:ext uri="{FF2B5EF4-FFF2-40B4-BE49-F238E27FC236}">
+                <a16:creationId xmlns:a16="http://schemas.microsoft.com/office/drawing/2014/main" id="{FA232715-E8C3-45A6-A109-B98DF09876D9}"/>
+              </a:ext>
+            </a:extLst>
+          </p:cNvPr>
+          <p:cNvCxnSpPr>
+            <a:cxnSpLocks/>
+          </p:cNvCxnSpPr>
+          <p:nvPr/>
+        </p:nvCxnSpPr>
+        <p:spPr>
+          <a:xfrm>
+            <a:off x="7481632" y="1991360"/>
+            <a:ext cx="0" cy="3378200"/>
+          </a:xfrm>
+          <a:prstGeom prst="line">
+            <a:avLst/>
+          </a:prstGeom>
+          <a:ln w="38100">
+            <a:solidFill>
+              <a:srgbClr val="7030A0"/>
+            </a:solidFill>
+            <a:prstDash val="dashDot"/>
+          </a:ln>
+        </p:spPr>
+        <p:style>
+          <a:lnRef idx="1">
+            <a:schemeClr val="accent1"/>
+          </a:lnRef>
+          <a:fillRef idx="0">
+            <a:schemeClr val="accent1"/>
+          </a:fillRef>
+          <a:effectRef idx="0">
+            <a:schemeClr val="accent1"/>
+          </a:effectRef>
+          <a:fontRef idx="minor">
+            <a:schemeClr val="tx1"/>
+          </a:fontRef>
+        </p:style>
+      </p:cxnSp>
+    </p:spTree>
+    <p:extLst>
+      <p:ext uri="{BB962C8B-B14F-4D97-AF65-F5344CB8AC3E}">
+        <p14:creationId xmlns:p14="http://schemas.microsoft.com/office/powerpoint/2010/main" val="197271480"/>
+      </p:ext>
+    </p:extLst>
+  </p:cSld>
+  <p:clrMapOvr>
+    <a:masterClrMapping/>
+  </p:clrMapOvr>
+</p:sld>
+</file>
+
+<file path=ppt/slides/slide25.xml><?xml version="1.0" encoding="utf-8"?>
+<p:sld xmlns:a="http://schemas.openxmlformats.org/drawingml/2006/main" xmlns:r="http://schemas.openxmlformats.org/officeDocument/2006/relationships" xmlns:p="http://schemas.openxmlformats.org/presentationml/2006/main">
+  <p:cSld>
+    <p:spTree>
+      <p:nvGrpSpPr>
+        <p:cNvPr id="1" name=""/>
+        <p:cNvGrpSpPr/>
+        <p:nvPr/>
+      </p:nvGrpSpPr>
+      <p:grpSpPr>
+        <a:xfrm>
+          <a:off x="0" y="0"/>
+          <a:ext cx="0" cy="0"/>
+          <a:chOff x="0" y="0"/>
+          <a:chExt cx="0" cy="0"/>
+        </a:xfrm>
+      </p:grpSpPr>
+      <p:pic>
+        <p:nvPicPr>
+          <p:cNvPr id="3" name="圖片 2">
+            <a:extLst>
+              <a:ext uri="{FF2B5EF4-FFF2-40B4-BE49-F238E27FC236}">
+                <a16:creationId xmlns:a16="http://schemas.microsoft.com/office/drawing/2014/main" id="{5F3605F6-2972-4E17-B8FE-FE9836948632}"/>
+              </a:ext>
+            </a:extLst>
+          </p:cNvPr>
+          <p:cNvPicPr>
+            <a:picLocks noChangeAspect="1"/>
+          </p:cNvPicPr>
+          <p:nvPr/>
+        </p:nvPicPr>
+        <p:blipFill>
+          <a:blip r:embed="rId2">
+            <a:extLst>
+              <a:ext uri="{28A0092B-C50C-407E-A947-70E740481C1C}">
+                <a14:useLocalDpi xmlns:a14="http://schemas.microsoft.com/office/drawing/2010/main" val="0"/>
+              </a:ext>
+            </a:extLst>
+          </a:blip>
+          <a:stretch>
+            <a:fillRect/>
+          </a:stretch>
+        </p:blipFill>
+        <p:spPr>
+          <a:xfrm>
+            <a:off x="2446020" y="0"/>
+            <a:ext cx="7299960" cy="6858000"/>
+          </a:xfrm>
+          <a:prstGeom prst="rect">
+            <a:avLst/>
+          </a:prstGeom>
+        </p:spPr>
+      </p:pic>
+      <p:cxnSp>
+        <p:nvCxnSpPr>
+          <p:cNvPr id="4" name="直線接點 3">
+            <a:extLst>
+              <a:ext uri="{FF2B5EF4-FFF2-40B4-BE49-F238E27FC236}">
+                <a16:creationId xmlns:a16="http://schemas.microsoft.com/office/drawing/2014/main" id="{AA9019AA-F5DF-406C-99E7-DD958F30498C}"/>
+              </a:ext>
+            </a:extLst>
+          </p:cNvPr>
+          <p:cNvCxnSpPr>
+            <a:cxnSpLocks/>
+          </p:cNvCxnSpPr>
+          <p:nvPr/>
+        </p:nvCxnSpPr>
+        <p:spPr>
+          <a:xfrm>
+            <a:off x="7350925" y="1584960"/>
+            <a:ext cx="0" cy="4211320"/>
+          </a:xfrm>
+          <a:prstGeom prst="line">
+            <a:avLst/>
+          </a:prstGeom>
+          <a:ln w="38100">
+            <a:solidFill>
+              <a:srgbClr val="7030A0"/>
+            </a:solidFill>
+            <a:prstDash val="dashDot"/>
+          </a:ln>
+        </p:spPr>
+        <p:style>
+          <a:lnRef idx="1">
+            <a:schemeClr val="accent1"/>
+          </a:lnRef>
+          <a:fillRef idx="0">
+            <a:schemeClr val="accent1"/>
+          </a:fillRef>
+          <a:effectRef idx="0">
+            <a:schemeClr val="accent1"/>
+          </a:effectRef>
+          <a:fontRef idx="minor">
+            <a:schemeClr val="tx1"/>
+          </a:fontRef>
+        </p:style>
+      </p:cxnSp>
+    </p:spTree>
+    <p:extLst>
+      <p:ext uri="{BB962C8B-B14F-4D97-AF65-F5344CB8AC3E}">
+        <p14:creationId xmlns:p14="http://schemas.microsoft.com/office/powerpoint/2010/main" val="2727136004"/>
+      </p:ext>
+    </p:extLst>
+  </p:cSld>
+  <p:clrMapOvr>
+    <a:masterClrMapping/>
+  </p:clrMapOvr>
+</p:sld>
+</file>
+
+<file path=ppt/slides/slide26.xml><?xml version="1.0" encoding="utf-8"?>
+<p:sld xmlns:a="http://schemas.openxmlformats.org/drawingml/2006/main" xmlns:r="http://schemas.openxmlformats.org/officeDocument/2006/relationships" xmlns:p="http://schemas.openxmlformats.org/presentationml/2006/main">
+  <p:cSld>
+    <p:spTree>
+      <p:nvGrpSpPr>
+        <p:cNvPr id="1" name=""/>
+        <p:cNvGrpSpPr/>
+        <p:nvPr/>
+      </p:nvGrpSpPr>
+      <p:grpSpPr>
+        <a:xfrm>
+          <a:off x="0" y="0"/>
+          <a:ext cx="0" cy="0"/>
+          <a:chOff x="0" y="0"/>
+          <a:chExt cx="0" cy="0"/>
+        </a:xfrm>
+      </p:grpSpPr>
+      <p:pic>
+        <p:nvPicPr>
+          <p:cNvPr id="3" name="圖片 2">
+            <a:extLst>
+              <a:ext uri="{FF2B5EF4-FFF2-40B4-BE49-F238E27FC236}">
+                <a16:creationId xmlns:a16="http://schemas.microsoft.com/office/drawing/2014/main" id="{687A6964-7803-4845-8B8A-5A2D36338C1F}"/>
+              </a:ext>
+            </a:extLst>
+          </p:cNvPr>
+          <p:cNvPicPr>
+            <a:picLocks noChangeAspect="1"/>
+          </p:cNvPicPr>
+          <p:nvPr/>
+        </p:nvPicPr>
+        <p:blipFill>
+          <a:blip r:embed="rId2">
+            <a:extLst>
+              <a:ext uri="{28A0092B-C50C-407E-A947-70E740481C1C}">
+                <a14:useLocalDpi xmlns:a14="http://schemas.microsoft.com/office/drawing/2010/main" val="0"/>
+              </a:ext>
+            </a:extLst>
+          </a:blip>
+          <a:stretch>
+            <a:fillRect/>
+          </a:stretch>
+        </p:blipFill>
+        <p:spPr>
+          <a:xfrm>
+            <a:off x="2446020" y="0"/>
+            <a:ext cx="7299960" cy="6858000"/>
+          </a:xfrm>
+          <a:prstGeom prst="rect">
+            <a:avLst/>
+          </a:prstGeom>
+        </p:spPr>
+      </p:pic>
+      <p:cxnSp>
+        <p:nvCxnSpPr>
+          <p:cNvPr id="4" name="直線接點 3">
+            <a:extLst>
+              <a:ext uri="{FF2B5EF4-FFF2-40B4-BE49-F238E27FC236}">
+                <a16:creationId xmlns:a16="http://schemas.microsoft.com/office/drawing/2014/main" id="{335C62D8-6CE7-45BA-821C-F47238EFD9D1}"/>
+              </a:ext>
+            </a:extLst>
+          </p:cNvPr>
+          <p:cNvCxnSpPr>
+            <a:cxnSpLocks/>
+          </p:cNvCxnSpPr>
+          <p:nvPr/>
+        </p:nvCxnSpPr>
+        <p:spPr>
+          <a:xfrm>
+            <a:off x="7481632" y="1377950"/>
+            <a:ext cx="0" cy="4613275"/>
+          </a:xfrm>
+          <a:prstGeom prst="line">
+            <a:avLst/>
+          </a:prstGeom>
+          <a:ln w="38100">
+            <a:solidFill>
+              <a:srgbClr val="7030A0"/>
+            </a:solidFill>
+            <a:prstDash val="dashDot"/>
+          </a:ln>
+        </p:spPr>
+        <p:style>
+          <a:lnRef idx="1">
+            <a:schemeClr val="accent1"/>
+          </a:lnRef>
+          <a:fillRef idx="0">
+            <a:schemeClr val="accent1"/>
+          </a:fillRef>
+          <a:effectRef idx="0">
+            <a:schemeClr val="accent1"/>
+          </a:effectRef>
+          <a:fontRef idx="minor">
+            <a:schemeClr val="tx1"/>
+          </a:fontRef>
+        </p:style>
+      </p:cxnSp>
+    </p:spTree>
+    <p:extLst>
+      <p:ext uri="{BB962C8B-B14F-4D97-AF65-F5344CB8AC3E}">
+        <p14:creationId xmlns:p14="http://schemas.microsoft.com/office/powerpoint/2010/main" val="2375819231"/>
       </p:ext>
     </p:extLst>
   </p:cSld>
@@ -3186,7 +5449,13 @@
       </p:grpSpPr>
       <p:pic>
         <p:nvPicPr>
-          <p:cNvPr id="4" name="圖片 3"/>
+          <p:cNvPr id="3" name="圖片 2">
+            <a:extLst>
+              <a:ext uri="{FF2B5EF4-FFF2-40B4-BE49-F238E27FC236}">
+                <a16:creationId xmlns:a16="http://schemas.microsoft.com/office/drawing/2014/main" id="{613A98D2-F2CB-4232-85DD-8FD422C913F4}"/>
+              </a:ext>
+            </a:extLst>
+          </p:cNvPr>
           <p:cNvPicPr>
             <a:picLocks noChangeAspect="1"/>
           </p:cNvPicPr>
@@ -3206,8 +5475,8 @@
         </p:blipFill>
         <p:spPr>
           <a:xfrm>
-            <a:off x="354418" y="0"/>
-            <a:ext cx="11483163" cy="6858000"/>
+            <a:off x="3747760" y="1609471"/>
+            <a:ext cx="4696480" cy="3639058"/>
           </a:xfrm>
           <a:prstGeom prst="rect">
             <a:avLst/>
@@ -3216,14 +5485,20 @@
       </p:pic>
       <p:sp>
         <p:nvSpPr>
-          <p:cNvPr id="3" name="矩形 2"/>
+          <p:cNvPr id="4" name="矩形 3">
+            <a:extLst>
+              <a:ext uri="{FF2B5EF4-FFF2-40B4-BE49-F238E27FC236}">
+                <a16:creationId xmlns:a16="http://schemas.microsoft.com/office/drawing/2014/main" id="{DEBAD30D-7B58-432A-9533-A0A4E15F5023}"/>
+              </a:ext>
+            </a:extLst>
+          </p:cNvPr>
           <p:cNvSpPr/>
           <p:nvPr/>
         </p:nvSpPr>
         <p:spPr>
           <a:xfrm>
-            <a:off x="4518209" y="4883970"/>
-            <a:ext cx="4950000" cy="360000"/>
+            <a:off x="6683602" y="4921967"/>
+            <a:ext cx="810000" cy="270000"/>
           </a:xfrm>
           <a:prstGeom prst="rect">
             <a:avLst/>
@@ -3263,7 +5538,7 @@
     </p:spTree>
     <p:extLst>
       <p:ext uri="{BB962C8B-B14F-4D97-AF65-F5344CB8AC3E}">
-        <p14:creationId xmlns:p14="http://schemas.microsoft.com/office/powerpoint/2010/main" val="1030518843"/>
+        <p14:creationId xmlns:p14="http://schemas.microsoft.com/office/powerpoint/2010/main" val="1059859608"/>
       </p:ext>
     </p:extLst>
   </p:cSld>
@@ -3292,7 +5567,13 @@
       </p:grpSpPr>
       <p:pic>
         <p:nvPicPr>
-          <p:cNvPr id="3" name="圖片 2"/>
+          <p:cNvPr id="3" name="圖片 2">
+            <a:extLst>
+              <a:ext uri="{FF2B5EF4-FFF2-40B4-BE49-F238E27FC236}">
+                <a16:creationId xmlns:a16="http://schemas.microsoft.com/office/drawing/2014/main" id="{76E12FAD-18C7-435F-B692-1029868B050F}"/>
+              </a:ext>
+            </a:extLst>
+          </p:cNvPr>
           <p:cNvPicPr>
             <a:picLocks noChangeAspect="1"/>
           </p:cNvPicPr>
@@ -3312,8 +5593,8 @@
         </p:blipFill>
         <p:spPr>
           <a:xfrm>
-            <a:off x="354418" y="0"/>
-            <a:ext cx="11483163" cy="6858000"/>
+            <a:off x="3747760" y="1609471"/>
+            <a:ext cx="4696480" cy="3639058"/>
           </a:xfrm>
           <a:prstGeom prst="rect">
             <a:avLst/>
@@ -3322,14 +5603,20 @@
       </p:pic>
       <p:sp>
         <p:nvSpPr>
-          <p:cNvPr id="4" name="矩形 3"/>
+          <p:cNvPr id="4" name="矩形 3">
+            <a:extLst>
+              <a:ext uri="{FF2B5EF4-FFF2-40B4-BE49-F238E27FC236}">
+                <a16:creationId xmlns:a16="http://schemas.microsoft.com/office/drawing/2014/main" id="{4EC3BC75-60FE-4F5E-ADB2-F2A21B182833}"/>
+              </a:ext>
+            </a:extLst>
+          </p:cNvPr>
           <p:cNvSpPr/>
           <p:nvPr/>
         </p:nvSpPr>
         <p:spPr>
           <a:xfrm>
-            <a:off x="8595362" y="2969109"/>
-            <a:ext cx="2250000" cy="450000"/>
+            <a:off x="6683602" y="4921967"/>
+            <a:ext cx="810000" cy="270000"/>
           </a:xfrm>
           <a:prstGeom prst="rect">
             <a:avLst/>
@@ -3366,10 +5653,860 @@
           </a:p>
         </p:txBody>
       </p:sp>
+      <p:sp>
+        <p:nvSpPr>
+          <p:cNvPr id="5" name="矩形 4">
+            <a:extLst>
+              <a:ext uri="{FF2B5EF4-FFF2-40B4-BE49-F238E27FC236}">
+                <a16:creationId xmlns:a16="http://schemas.microsoft.com/office/drawing/2014/main" id="{9909AD9D-618D-44ED-BD0D-99F114654AB9}"/>
+              </a:ext>
+            </a:extLst>
+          </p:cNvPr>
+          <p:cNvSpPr/>
+          <p:nvPr/>
+        </p:nvSpPr>
+        <p:spPr>
+          <a:xfrm>
+            <a:off x="3874416" y="4469479"/>
+            <a:ext cx="2430000" cy="270000"/>
+          </a:xfrm>
+          <a:prstGeom prst="rect">
+            <a:avLst/>
+          </a:prstGeom>
+          <a:noFill/>
+          <a:ln w="38100">
+            <a:solidFill>
+              <a:srgbClr val="FF0000"/>
+            </a:solidFill>
+          </a:ln>
+        </p:spPr>
+        <p:style>
+          <a:lnRef idx="2">
+            <a:schemeClr val="accent1">
+              <a:shade val="50000"/>
+            </a:schemeClr>
+          </a:lnRef>
+          <a:fillRef idx="1">
+            <a:schemeClr val="accent1"/>
+          </a:fillRef>
+          <a:effectRef idx="0">
+            <a:schemeClr val="accent1"/>
+          </a:effectRef>
+          <a:fontRef idx="minor">
+            <a:schemeClr val="lt1"/>
+          </a:fontRef>
+        </p:style>
+        <p:txBody>
+          <a:bodyPr rtlCol="0" anchor="ctr"/>
+          <a:lstStyle/>
+          <a:p>
+            <a:pPr algn="ctr"/>
+            <a:endParaRPr lang="zh-TW" altLang="en-US"/>
+          </a:p>
+        </p:txBody>
+      </p:sp>
     </p:spTree>
     <p:extLst>
       <p:ext uri="{BB962C8B-B14F-4D97-AF65-F5344CB8AC3E}">
-        <p14:creationId xmlns:p14="http://schemas.microsoft.com/office/powerpoint/2010/main" val="3279501541"/>
+        <p14:creationId xmlns:p14="http://schemas.microsoft.com/office/powerpoint/2010/main" val="124689311"/>
+      </p:ext>
+    </p:extLst>
+  </p:cSld>
+  <p:clrMapOvr>
+    <a:masterClrMapping/>
+  </p:clrMapOvr>
+</p:sld>
+</file>
+
+<file path=ppt/slides/slide5.xml><?xml version="1.0" encoding="utf-8"?>
+<p:sld xmlns:a="http://schemas.openxmlformats.org/drawingml/2006/main" xmlns:r="http://schemas.openxmlformats.org/officeDocument/2006/relationships" xmlns:p="http://schemas.openxmlformats.org/presentationml/2006/main">
+  <p:cSld>
+    <p:spTree>
+      <p:nvGrpSpPr>
+        <p:cNvPr id="1" name=""/>
+        <p:cNvGrpSpPr/>
+        <p:nvPr/>
+      </p:nvGrpSpPr>
+      <p:grpSpPr>
+        <a:xfrm>
+          <a:off x="0" y="0"/>
+          <a:ext cx="0" cy="0"/>
+          <a:chOff x="0" y="0"/>
+          <a:chExt cx="0" cy="0"/>
+        </a:xfrm>
+      </p:grpSpPr>
+      <p:pic>
+        <p:nvPicPr>
+          <p:cNvPr id="3" name="圖片 2">
+            <a:extLst>
+              <a:ext uri="{FF2B5EF4-FFF2-40B4-BE49-F238E27FC236}">
+                <a16:creationId xmlns:a16="http://schemas.microsoft.com/office/drawing/2014/main" id="{70EE3CB2-7924-43BB-825B-2BD8A61ACD6F}"/>
+              </a:ext>
+            </a:extLst>
+          </p:cNvPr>
+          <p:cNvPicPr>
+            <a:picLocks noChangeAspect="1"/>
+          </p:cNvPicPr>
+          <p:nvPr/>
+        </p:nvPicPr>
+        <p:blipFill>
+          <a:blip r:embed="rId2">
+            <a:extLst>
+              <a:ext uri="{28A0092B-C50C-407E-A947-70E740481C1C}">
+                <a14:useLocalDpi xmlns:a14="http://schemas.microsoft.com/office/drawing/2010/main" val="0"/>
+              </a:ext>
+            </a:extLst>
+          </a:blip>
+          <a:stretch>
+            <a:fillRect/>
+          </a:stretch>
+        </p:blipFill>
+        <p:spPr>
+          <a:xfrm>
+            <a:off x="3747760" y="1609471"/>
+            <a:ext cx="4696480" cy="3639058"/>
+          </a:xfrm>
+          <a:prstGeom prst="rect">
+            <a:avLst/>
+          </a:prstGeom>
+        </p:spPr>
+      </p:pic>
+      <p:sp>
+        <p:nvSpPr>
+          <p:cNvPr id="4" name="矩形 3">
+            <a:extLst>
+              <a:ext uri="{FF2B5EF4-FFF2-40B4-BE49-F238E27FC236}">
+                <a16:creationId xmlns:a16="http://schemas.microsoft.com/office/drawing/2014/main" id="{99CCFDC8-F47D-439F-90AF-5DF7839F3FEB}"/>
+              </a:ext>
+            </a:extLst>
+          </p:cNvPr>
+          <p:cNvSpPr/>
+          <p:nvPr/>
+        </p:nvSpPr>
+        <p:spPr>
+          <a:xfrm>
+            <a:off x="6683602" y="4921967"/>
+            <a:ext cx="810000" cy="270000"/>
+          </a:xfrm>
+          <a:prstGeom prst="rect">
+            <a:avLst/>
+          </a:prstGeom>
+          <a:noFill/>
+          <a:ln w="38100">
+            <a:solidFill>
+              <a:srgbClr val="FF0000"/>
+            </a:solidFill>
+          </a:ln>
+        </p:spPr>
+        <p:style>
+          <a:lnRef idx="2">
+            <a:schemeClr val="accent1">
+              <a:shade val="50000"/>
+            </a:schemeClr>
+          </a:lnRef>
+          <a:fillRef idx="1">
+            <a:schemeClr val="accent1"/>
+          </a:fillRef>
+          <a:effectRef idx="0">
+            <a:schemeClr val="accent1"/>
+          </a:effectRef>
+          <a:fontRef idx="minor">
+            <a:schemeClr val="lt1"/>
+          </a:fontRef>
+        </p:style>
+        <p:txBody>
+          <a:bodyPr rtlCol="0" anchor="ctr"/>
+          <a:lstStyle/>
+          <a:p>
+            <a:pPr algn="ctr"/>
+            <a:endParaRPr lang="zh-TW" altLang="en-US"/>
+          </a:p>
+        </p:txBody>
+      </p:sp>
+    </p:spTree>
+    <p:extLst>
+      <p:ext uri="{BB962C8B-B14F-4D97-AF65-F5344CB8AC3E}">
+        <p14:creationId xmlns:p14="http://schemas.microsoft.com/office/powerpoint/2010/main" val="3347766184"/>
+      </p:ext>
+    </p:extLst>
+  </p:cSld>
+  <p:clrMapOvr>
+    <a:masterClrMapping/>
+  </p:clrMapOvr>
+</p:sld>
+</file>
+
+<file path=ppt/slides/slide6.xml><?xml version="1.0" encoding="utf-8"?>
+<p:sld xmlns:a="http://schemas.openxmlformats.org/drawingml/2006/main" xmlns:r="http://schemas.openxmlformats.org/officeDocument/2006/relationships" xmlns:p="http://schemas.openxmlformats.org/presentationml/2006/main">
+  <p:cSld>
+    <p:spTree>
+      <p:nvGrpSpPr>
+        <p:cNvPr id="1" name=""/>
+        <p:cNvGrpSpPr/>
+        <p:nvPr/>
+      </p:nvGrpSpPr>
+      <p:grpSpPr>
+        <a:xfrm>
+          <a:off x="0" y="0"/>
+          <a:ext cx="0" cy="0"/>
+          <a:chOff x="0" y="0"/>
+          <a:chExt cx="0" cy="0"/>
+        </a:xfrm>
+      </p:grpSpPr>
+      <p:pic>
+        <p:nvPicPr>
+          <p:cNvPr id="3" name="圖片 2">
+            <a:extLst>
+              <a:ext uri="{FF2B5EF4-FFF2-40B4-BE49-F238E27FC236}">
+                <a16:creationId xmlns:a16="http://schemas.microsoft.com/office/drawing/2014/main" id="{BAB42A68-0B11-4B5C-80F2-57CD48F233A4}"/>
+              </a:ext>
+            </a:extLst>
+          </p:cNvPr>
+          <p:cNvPicPr>
+            <a:picLocks noChangeAspect="1"/>
+          </p:cNvPicPr>
+          <p:nvPr/>
+        </p:nvPicPr>
+        <p:blipFill>
+          <a:blip r:embed="rId2">
+            <a:extLst>
+              <a:ext uri="{28A0092B-C50C-407E-A947-70E740481C1C}">
+                <a14:useLocalDpi xmlns:a14="http://schemas.microsoft.com/office/drawing/2010/main" val="0"/>
+              </a:ext>
+            </a:extLst>
+          </a:blip>
+          <a:stretch>
+            <a:fillRect/>
+          </a:stretch>
+        </p:blipFill>
+        <p:spPr>
+          <a:xfrm>
+            <a:off x="3747760" y="1609471"/>
+            <a:ext cx="4696480" cy="3639058"/>
+          </a:xfrm>
+          <a:prstGeom prst="rect">
+            <a:avLst/>
+          </a:prstGeom>
+        </p:spPr>
+      </p:pic>
+      <p:sp>
+        <p:nvSpPr>
+          <p:cNvPr id="4" name="矩形 3">
+            <a:extLst>
+              <a:ext uri="{FF2B5EF4-FFF2-40B4-BE49-F238E27FC236}">
+                <a16:creationId xmlns:a16="http://schemas.microsoft.com/office/drawing/2014/main" id="{DA42CFAD-88F4-45B5-BDE0-6BBFB25E47CA}"/>
+              </a:ext>
+            </a:extLst>
+          </p:cNvPr>
+          <p:cNvSpPr/>
+          <p:nvPr/>
+        </p:nvSpPr>
+        <p:spPr>
+          <a:xfrm>
+            <a:off x="6853288" y="4921967"/>
+            <a:ext cx="810000" cy="270000"/>
+          </a:xfrm>
+          <a:prstGeom prst="rect">
+            <a:avLst/>
+          </a:prstGeom>
+          <a:noFill/>
+          <a:ln w="38100">
+            <a:solidFill>
+              <a:srgbClr val="FF0000"/>
+            </a:solidFill>
+          </a:ln>
+        </p:spPr>
+        <p:style>
+          <a:lnRef idx="2">
+            <a:schemeClr val="accent1">
+              <a:shade val="50000"/>
+            </a:schemeClr>
+          </a:lnRef>
+          <a:fillRef idx="1">
+            <a:schemeClr val="accent1"/>
+          </a:fillRef>
+          <a:effectRef idx="0">
+            <a:schemeClr val="accent1"/>
+          </a:effectRef>
+          <a:fontRef idx="minor">
+            <a:schemeClr val="lt1"/>
+          </a:fontRef>
+        </p:style>
+        <p:txBody>
+          <a:bodyPr rtlCol="0" anchor="ctr"/>
+          <a:lstStyle/>
+          <a:p>
+            <a:pPr algn="ctr"/>
+            <a:endParaRPr lang="zh-TW" altLang="en-US"/>
+          </a:p>
+        </p:txBody>
+      </p:sp>
+    </p:spTree>
+    <p:extLst>
+      <p:ext uri="{BB962C8B-B14F-4D97-AF65-F5344CB8AC3E}">
+        <p14:creationId xmlns:p14="http://schemas.microsoft.com/office/powerpoint/2010/main" val="995251966"/>
+      </p:ext>
+    </p:extLst>
+  </p:cSld>
+  <p:clrMapOvr>
+    <a:masterClrMapping/>
+  </p:clrMapOvr>
+</p:sld>
+</file>
+
+<file path=ppt/slides/slide7.xml><?xml version="1.0" encoding="utf-8"?>
+<p:sld xmlns:a="http://schemas.openxmlformats.org/drawingml/2006/main" xmlns:r="http://schemas.openxmlformats.org/officeDocument/2006/relationships" xmlns:p="http://schemas.openxmlformats.org/presentationml/2006/main">
+  <p:cSld>
+    <p:spTree>
+      <p:nvGrpSpPr>
+        <p:cNvPr id="1" name=""/>
+        <p:cNvGrpSpPr/>
+        <p:nvPr/>
+      </p:nvGrpSpPr>
+      <p:grpSpPr>
+        <a:xfrm>
+          <a:off x="0" y="0"/>
+          <a:ext cx="0" cy="0"/>
+          <a:chOff x="0" y="0"/>
+          <a:chExt cx="0" cy="0"/>
+        </a:xfrm>
+      </p:grpSpPr>
+      <p:pic>
+        <p:nvPicPr>
+          <p:cNvPr id="3" name="圖片 2">
+            <a:extLst>
+              <a:ext uri="{FF2B5EF4-FFF2-40B4-BE49-F238E27FC236}">
+                <a16:creationId xmlns:a16="http://schemas.microsoft.com/office/drawing/2014/main" id="{18BE3655-D412-4B75-BBEC-3E8260AFFF19}"/>
+              </a:ext>
+            </a:extLst>
+          </p:cNvPr>
+          <p:cNvPicPr>
+            <a:picLocks noChangeAspect="1"/>
+          </p:cNvPicPr>
+          <p:nvPr/>
+        </p:nvPicPr>
+        <p:blipFill>
+          <a:blip r:embed="rId2">
+            <a:extLst>
+              <a:ext uri="{28A0092B-C50C-407E-A947-70E740481C1C}">
+                <a14:useLocalDpi xmlns:a14="http://schemas.microsoft.com/office/drawing/2010/main" val="0"/>
+              </a:ext>
+            </a:extLst>
+          </a:blip>
+          <a:stretch>
+            <a:fillRect/>
+          </a:stretch>
+        </p:blipFill>
+        <p:spPr>
+          <a:xfrm>
+            <a:off x="3747760" y="1609471"/>
+            <a:ext cx="4696480" cy="3639058"/>
+          </a:xfrm>
+          <a:prstGeom prst="rect">
+            <a:avLst/>
+          </a:prstGeom>
+        </p:spPr>
+      </p:pic>
+      <p:sp>
+        <p:nvSpPr>
+          <p:cNvPr id="4" name="矩形 3">
+            <a:extLst>
+              <a:ext uri="{FF2B5EF4-FFF2-40B4-BE49-F238E27FC236}">
+                <a16:creationId xmlns:a16="http://schemas.microsoft.com/office/drawing/2014/main" id="{A72AD761-6327-4F40-A7AF-D3889826E72C}"/>
+              </a:ext>
+            </a:extLst>
+          </p:cNvPr>
+          <p:cNvSpPr/>
+          <p:nvPr/>
+        </p:nvSpPr>
+        <p:spPr>
+          <a:xfrm>
+            <a:off x="6400792" y="4912540"/>
+            <a:ext cx="1080000" cy="270000"/>
+          </a:xfrm>
+          <a:prstGeom prst="rect">
+            <a:avLst/>
+          </a:prstGeom>
+          <a:noFill/>
+          <a:ln w="38100">
+            <a:solidFill>
+              <a:srgbClr val="FF0000"/>
+            </a:solidFill>
+          </a:ln>
+        </p:spPr>
+        <p:style>
+          <a:lnRef idx="2">
+            <a:schemeClr val="accent1">
+              <a:shade val="50000"/>
+            </a:schemeClr>
+          </a:lnRef>
+          <a:fillRef idx="1">
+            <a:schemeClr val="accent1"/>
+          </a:fillRef>
+          <a:effectRef idx="0">
+            <a:schemeClr val="accent1"/>
+          </a:effectRef>
+          <a:fontRef idx="minor">
+            <a:schemeClr val="lt1"/>
+          </a:fontRef>
+        </p:style>
+        <p:txBody>
+          <a:bodyPr rtlCol="0" anchor="ctr"/>
+          <a:lstStyle/>
+          <a:p>
+            <a:pPr algn="ctr"/>
+            <a:endParaRPr lang="zh-TW" altLang="en-US"/>
+          </a:p>
+        </p:txBody>
+      </p:sp>
+    </p:spTree>
+    <p:extLst>
+      <p:ext uri="{BB962C8B-B14F-4D97-AF65-F5344CB8AC3E}">
+        <p14:creationId xmlns:p14="http://schemas.microsoft.com/office/powerpoint/2010/main" val="460772592"/>
+      </p:ext>
+    </p:extLst>
+  </p:cSld>
+  <p:clrMapOvr>
+    <a:masterClrMapping/>
+  </p:clrMapOvr>
+</p:sld>
+</file>
+
+<file path=ppt/slides/slide8.xml><?xml version="1.0" encoding="utf-8"?>
+<p:sld xmlns:a="http://schemas.openxmlformats.org/drawingml/2006/main" xmlns:r="http://schemas.openxmlformats.org/officeDocument/2006/relationships" xmlns:p="http://schemas.openxmlformats.org/presentationml/2006/main">
+  <p:cSld>
+    <p:spTree>
+      <p:nvGrpSpPr>
+        <p:cNvPr id="1" name=""/>
+        <p:cNvGrpSpPr/>
+        <p:nvPr/>
+      </p:nvGrpSpPr>
+      <p:grpSpPr>
+        <a:xfrm>
+          <a:off x="0" y="0"/>
+          <a:ext cx="0" cy="0"/>
+          <a:chOff x="0" y="0"/>
+          <a:chExt cx="0" cy="0"/>
+        </a:xfrm>
+      </p:grpSpPr>
+      <p:pic>
+        <p:nvPicPr>
+          <p:cNvPr id="3" name="圖片 2">
+            <a:extLst>
+              <a:ext uri="{FF2B5EF4-FFF2-40B4-BE49-F238E27FC236}">
+                <a16:creationId xmlns:a16="http://schemas.microsoft.com/office/drawing/2014/main" id="{5E7CC90F-36D4-413C-B74E-801423D2FF46}"/>
+              </a:ext>
+            </a:extLst>
+          </p:cNvPr>
+          <p:cNvPicPr>
+            <a:picLocks noChangeAspect="1"/>
+          </p:cNvPicPr>
+          <p:nvPr/>
+        </p:nvPicPr>
+        <p:blipFill>
+          <a:blip r:embed="rId2">
+            <a:extLst>
+              <a:ext uri="{28A0092B-C50C-407E-A947-70E740481C1C}">
+                <a14:useLocalDpi xmlns:a14="http://schemas.microsoft.com/office/drawing/2010/main" val="0"/>
+              </a:ext>
+            </a:extLst>
+          </a:blip>
+          <a:stretch>
+            <a:fillRect/>
+          </a:stretch>
+        </p:blipFill>
+        <p:spPr>
+          <a:xfrm>
+            <a:off x="3747760" y="1609471"/>
+            <a:ext cx="4696480" cy="3639058"/>
+          </a:xfrm>
+          <a:prstGeom prst="rect">
+            <a:avLst/>
+          </a:prstGeom>
+        </p:spPr>
+      </p:pic>
+      <p:sp>
+        <p:nvSpPr>
+          <p:cNvPr id="4" name="矩形 3">
+            <a:extLst>
+              <a:ext uri="{FF2B5EF4-FFF2-40B4-BE49-F238E27FC236}">
+                <a16:creationId xmlns:a16="http://schemas.microsoft.com/office/drawing/2014/main" id="{CF6AD1E8-5166-43F2-847D-27EB3173DB4F}"/>
+              </a:ext>
+            </a:extLst>
+          </p:cNvPr>
+          <p:cNvSpPr/>
+          <p:nvPr/>
+        </p:nvSpPr>
+        <p:spPr>
+          <a:xfrm>
+            <a:off x="6683602" y="4921967"/>
+            <a:ext cx="810000" cy="270000"/>
+          </a:xfrm>
+          <a:prstGeom prst="rect">
+            <a:avLst/>
+          </a:prstGeom>
+          <a:noFill/>
+          <a:ln w="38100">
+            <a:solidFill>
+              <a:srgbClr val="FF0000"/>
+            </a:solidFill>
+          </a:ln>
+        </p:spPr>
+        <p:style>
+          <a:lnRef idx="2">
+            <a:schemeClr val="accent1">
+              <a:shade val="50000"/>
+            </a:schemeClr>
+          </a:lnRef>
+          <a:fillRef idx="1">
+            <a:schemeClr val="accent1"/>
+          </a:fillRef>
+          <a:effectRef idx="0">
+            <a:schemeClr val="accent1"/>
+          </a:effectRef>
+          <a:fontRef idx="minor">
+            <a:schemeClr val="lt1"/>
+          </a:fontRef>
+        </p:style>
+        <p:txBody>
+          <a:bodyPr rtlCol="0" anchor="ctr"/>
+          <a:lstStyle/>
+          <a:p>
+            <a:pPr algn="ctr"/>
+            <a:endParaRPr lang="zh-TW" altLang="en-US"/>
+          </a:p>
+        </p:txBody>
+      </p:sp>
+    </p:spTree>
+    <p:extLst>
+      <p:ext uri="{BB962C8B-B14F-4D97-AF65-F5344CB8AC3E}">
+        <p14:creationId xmlns:p14="http://schemas.microsoft.com/office/powerpoint/2010/main" val="3310315263"/>
+      </p:ext>
+    </p:extLst>
+  </p:cSld>
+  <p:clrMapOvr>
+    <a:masterClrMapping/>
+  </p:clrMapOvr>
+</p:sld>
+</file>
+
+<file path=ppt/slides/slide9.xml><?xml version="1.0" encoding="utf-8"?>
+<p:sld xmlns:a="http://schemas.openxmlformats.org/drawingml/2006/main" xmlns:r="http://schemas.openxmlformats.org/officeDocument/2006/relationships" xmlns:p="http://schemas.openxmlformats.org/presentationml/2006/main">
+  <p:cSld>
+    <p:spTree>
+      <p:nvGrpSpPr>
+        <p:cNvPr id="1" name=""/>
+        <p:cNvGrpSpPr/>
+        <p:nvPr/>
+      </p:nvGrpSpPr>
+      <p:grpSpPr>
+        <a:xfrm>
+          <a:off x="0" y="0"/>
+          <a:ext cx="0" cy="0"/>
+          <a:chOff x="0" y="0"/>
+          <a:chExt cx="0" cy="0"/>
+        </a:xfrm>
+      </p:grpSpPr>
+      <p:pic>
+        <p:nvPicPr>
+          <p:cNvPr id="3" name="圖片 2">
+            <a:extLst>
+              <a:ext uri="{FF2B5EF4-FFF2-40B4-BE49-F238E27FC236}">
+                <a16:creationId xmlns:a16="http://schemas.microsoft.com/office/drawing/2014/main" id="{B18879E1-5DA5-4BE1-8D9B-42BBB30F0F4F}"/>
+              </a:ext>
+            </a:extLst>
+          </p:cNvPr>
+          <p:cNvPicPr>
+            <a:picLocks noChangeAspect="1"/>
+          </p:cNvPicPr>
+          <p:nvPr/>
+        </p:nvPicPr>
+        <p:blipFill>
+          <a:blip r:embed="rId2">
+            <a:extLst>
+              <a:ext uri="{28A0092B-C50C-407E-A947-70E740481C1C}">
+                <a14:useLocalDpi xmlns:a14="http://schemas.microsoft.com/office/drawing/2010/main" val="0"/>
+              </a:ext>
+            </a:extLst>
+          </a:blip>
+          <a:stretch>
+            <a:fillRect/>
+          </a:stretch>
+        </p:blipFill>
+        <p:spPr>
+          <a:xfrm>
+            <a:off x="609600" y="0"/>
+            <a:ext cx="10972800" cy="6858000"/>
+          </a:xfrm>
+          <a:prstGeom prst="rect">
+            <a:avLst/>
+          </a:prstGeom>
+        </p:spPr>
+      </p:pic>
+      <p:sp>
+        <p:nvSpPr>
+          <p:cNvPr id="4" name="矩形 3">
+            <a:extLst>
+              <a:ext uri="{FF2B5EF4-FFF2-40B4-BE49-F238E27FC236}">
+                <a16:creationId xmlns:a16="http://schemas.microsoft.com/office/drawing/2014/main" id="{01438427-597E-418A-BB5C-2E3DE2B0AA9D}"/>
+              </a:ext>
+            </a:extLst>
+          </p:cNvPr>
+          <p:cNvSpPr/>
+          <p:nvPr/>
+        </p:nvSpPr>
+        <p:spPr>
+          <a:xfrm>
+            <a:off x="609600" y="6498000"/>
+            <a:ext cx="360000" cy="360000"/>
+          </a:xfrm>
+          <a:prstGeom prst="rect">
+            <a:avLst/>
+          </a:prstGeom>
+          <a:noFill/>
+          <a:ln w="38100">
+            <a:solidFill>
+              <a:srgbClr val="FF0000"/>
+            </a:solidFill>
+          </a:ln>
+        </p:spPr>
+        <p:style>
+          <a:lnRef idx="2">
+            <a:schemeClr val="accent1">
+              <a:shade val="50000"/>
+            </a:schemeClr>
+          </a:lnRef>
+          <a:fillRef idx="1">
+            <a:schemeClr val="accent1"/>
+          </a:fillRef>
+          <a:effectRef idx="0">
+            <a:schemeClr val="accent1"/>
+          </a:effectRef>
+          <a:fontRef idx="minor">
+            <a:schemeClr val="lt1"/>
+          </a:fontRef>
+        </p:style>
+        <p:txBody>
+          <a:bodyPr rtlCol="0" anchor="ctr"/>
+          <a:lstStyle/>
+          <a:p>
+            <a:pPr algn="ctr"/>
+            <a:endParaRPr lang="zh-TW" altLang="en-US"/>
+          </a:p>
+        </p:txBody>
+      </p:sp>
+      <p:sp>
+        <p:nvSpPr>
+          <p:cNvPr id="5" name="矩形 4">
+            <a:extLst>
+              <a:ext uri="{FF2B5EF4-FFF2-40B4-BE49-F238E27FC236}">
+                <a16:creationId xmlns:a16="http://schemas.microsoft.com/office/drawing/2014/main" id="{0AF0E5C4-52ED-4AF3-9CE0-7697687557CF}"/>
+              </a:ext>
+            </a:extLst>
+          </p:cNvPr>
+          <p:cNvSpPr/>
+          <p:nvPr/>
+        </p:nvSpPr>
+        <p:spPr>
+          <a:xfrm>
+            <a:off x="1055800" y="2697239"/>
+            <a:ext cx="1980000" cy="270000"/>
+          </a:xfrm>
+          <a:prstGeom prst="rect">
+            <a:avLst/>
+          </a:prstGeom>
+          <a:noFill/>
+          <a:ln w="38100">
+            <a:solidFill>
+              <a:srgbClr val="FF0000"/>
+            </a:solidFill>
+          </a:ln>
+        </p:spPr>
+        <p:style>
+          <a:lnRef idx="2">
+            <a:schemeClr val="accent1">
+              <a:shade val="50000"/>
+            </a:schemeClr>
+          </a:lnRef>
+          <a:fillRef idx="1">
+            <a:schemeClr val="accent1"/>
+          </a:fillRef>
+          <a:effectRef idx="0">
+            <a:schemeClr val="accent1"/>
+          </a:effectRef>
+          <a:fontRef idx="minor">
+            <a:schemeClr val="lt1"/>
+          </a:fontRef>
+        </p:style>
+        <p:txBody>
+          <a:bodyPr rtlCol="0" anchor="ctr"/>
+          <a:lstStyle/>
+          <a:p>
+            <a:pPr algn="ctr"/>
+            <a:endParaRPr lang="zh-TW" altLang="en-US"/>
+          </a:p>
+        </p:txBody>
+      </p:sp>
+      <p:sp>
+        <p:nvSpPr>
+          <p:cNvPr id="6" name="矩形 5">
+            <a:extLst>
+              <a:ext uri="{FF2B5EF4-FFF2-40B4-BE49-F238E27FC236}">
+                <a16:creationId xmlns:a16="http://schemas.microsoft.com/office/drawing/2014/main" id="{AD9B35C5-FBEE-4F6E-BDED-2511DF6946EF}"/>
+              </a:ext>
+            </a:extLst>
+          </p:cNvPr>
+          <p:cNvSpPr/>
+          <p:nvPr/>
+        </p:nvSpPr>
+        <p:spPr>
+          <a:xfrm>
+            <a:off x="1055800" y="3517369"/>
+            <a:ext cx="1980000" cy="270000"/>
+          </a:xfrm>
+          <a:prstGeom prst="rect">
+            <a:avLst/>
+          </a:prstGeom>
+          <a:noFill/>
+          <a:ln w="38100">
+            <a:solidFill>
+              <a:srgbClr val="FF0000"/>
+            </a:solidFill>
+          </a:ln>
+        </p:spPr>
+        <p:style>
+          <a:lnRef idx="2">
+            <a:schemeClr val="accent1">
+              <a:shade val="50000"/>
+            </a:schemeClr>
+          </a:lnRef>
+          <a:fillRef idx="1">
+            <a:schemeClr val="accent1"/>
+          </a:fillRef>
+          <a:effectRef idx="0">
+            <a:schemeClr val="accent1"/>
+          </a:effectRef>
+          <a:fontRef idx="minor">
+            <a:schemeClr val="lt1"/>
+          </a:fontRef>
+        </p:style>
+        <p:txBody>
+          <a:bodyPr rtlCol="0" anchor="ctr"/>
+          <a:lstStyle/>
+          <a:p>
+            <a:pPr algn="ctr"/>
+            <a:endParaRPr lang="zh-TW" altLang="en-US"/>
+          </a:p>
+        </p:txBody>
+      </p:sp>
+      <p:sp>
+        <p:nvSpPr>
+          <p:cNvPr id="7" name="矩形 6">
+            <a:extLst>
+              <a:ext uri="{FF2B5EF4-FFF2-40B4-BE49-F238E27FC236}">
+                <a16:creationId xmlns:a16="http://schemas.microsoft.com/office/drawing/2014/main" id="{4DC7FEA5-1CBA-4453-9E99-C892E476FCA8}"/>
+              </a:ext>
+            </a:extLst>
+          </p:cNvPr>
+          <p:cNvSpPr/>
+          <p:nvPr/>
+        </p:nvSpPr>
+        <p:spPr>
+          <a:xfrm>
+            <a:off x="2036373" y="3847897"/>
+            <a:ext cx="1980000" cy="270000"/>
+          </a:xfrm>
+          <a:prstGeom prst="rect">
+            <a:avLst/>
+          </a:prstGeom>
+          <a:noFill/>
+          <a:ln w="38100">
+            <a:solidFill>
+              <a:srgbClr val="FF0000"/>
+            </a:solidFill>
+          </a:ln>
+        </p:spPr>
+        <p:style>
+          <a:lnRef idx="2">
+            <a:schemeClr val="accent1">
+              <a:shade val="50000"/>
+            </a:schemeClr>
+          </a:lnRef>
+          <a:fillRef idx="1">
+            <a:schemeClr val="accent1"/>
+          </a:fillRef>
+          <a:effectRef idx="0">
+            <a:schemeClr val="accent1"/>
+          </a:effectRef>
+          <a:fontRef idx="minor">
+            <a:schemeClr val="lt1"/>
+          </a:fontRef>
+        </p:style>
+        <p:txBody>
+          <a:bodyPr rtlCol="0" anchor="ctr"/>
+          <a:lstStyle/>
+          <a:p>
+            <a:pPr algn="ctr"/>
+            <a:endParaRPr lang="zh-TW" altLang="en-US"/>
+          </a:p>
+        </p:txBody>
+      </p:sp>
+      <p:sp>
+        <p:nvSpPr>
+          <p:cNvPr id="8" name="矩形 7">
+            <a:extLst>
+              <a:ext uri="{FF2B5EF4-FFF2-40B4-BE49-F238E27FC236}">
+                <a16:creationId xmlns:a16="http://schemas.microsoft.com/office/drawing/2014/main" id="{CAE358AD-F0DF-4F49-AE71-F77943C37F99}"/>
+              </a:ext>
+            </a:extLst>
+          </p:cNvPr>
+          <p:cNvSpPr/>
+          <p:nvPr/>
+        </p:nvSpPr>
+        <p:spPr>
+          <a:xfrm>
+            <a:off x="3987723" y="4168998"/>
+            <a:ext cx="1980000" cy="270000"/>
+          </a:xfrm>
+          <a:prstGeom prst="rect">
+            <a:avLst/>
+          </a:prstGeom>
+          <a:noFill/>
+          <a:ln w="38100">
+            <a:solidFill>
+              <a:srgbClr val="FF0000"/>
+            </a:solidFill>
+          </a:ln>
+        </p:spPr>
+        <p:style>
+          <a:lnRef idx="2">
+            <a:schemeClr val="accent1">
+              <a:shade val="50000"/>
+            </a:schemeClr>
+          </a:lnRef>
+          <a:fillRef idx="1">
+            <a:schemeClr val="accent1"/>
+          </a:fillRef>
+          <a:effectRef idx="0">
+            <a:schemeClr val="accent1"/>
+          </a:effectRef>
+          <a:fontRef idx="minor">
+            <a:schemeClr val="lt1"/>
+          </a:fontRef>
+        </p:style>
+        <p:txBody>
+          <a:bodyPr rtlCol="0" anchor="ctr"/>
+          <a:lstStyle/>
+          <a:p>
+            <a:pPr algn="ctr"/>
+            <a:endParaRPr lang="zh-TW" altLang="en-US"/>
+          </a:p>
+        </p:txBody>
+      </p:sp>
+    </p:spTree>
+    <p:extLst>
+      <p:ext uri="{BB962C8B-B14F-4D97-AF65-F5344CB8AC3E}">
+        <p14:creationId xmlns:p14="http://schemas.microsoft.com/office/powerpoint/2010/main" val="3961947323"/>
       </p:ext>
     </p:extLst>
   </p:cSld>

</xml_diff>